<commit_message>
added lexical formats (OMW, TIAD-2017, TIAD-2019, TIAD-2020)
</commit_message>
<xml_diff>
--- a/owl/conll.pptx
+++ b/owl/conll.pptx
@@ -6,6 +6,7 @@
   </p:sldMasterIdLst>
   <p:sldIdLst>
     <p:sldId id="256" r:id="rId2"/>
+    <p:sldId id="257" r:id="rId3"/>
   </p:sldIdLst>
   <p:sldSz cx="9144000" cy="6858000" type="screen4x3"/>
   <p:notesSz cx="6858000" cy="9144000"/>
@@ -6178,6 +6179,3151 @@
     <p:extLst>
       <p:ext uri="{BB962C8B-B14F-4D97-AF65-F5344CB8AC3E}">
         <p14:creationId xmlns:p14="http://schemas.microsoft.com/office/powerpoint/2010/main" val="1381630504"/>
+      </p:ext>
+    </p:extLst>
+  </p:cSld>
+  <p:clrMapOvr>
+    <a:masterClrMapping/>
+  </p:clrMapOvr>
+</p:sld>
+</file>
+
+<file path=ppt/slides/slide2.xml><?xml version="1.0" encoding="utf-8"?>
+<p:sld xmlns:a="http://schemas.openxmlformats.org/drawingml/2006/main" xmlns:r="http://schemas.openxmlformats.org/officeDocument/2006/relationships" xmlns:p="http://schemas.openxmlformats.org/presentationml/2006/main">
+  <p:cSld>
+    <p:spTree>
+      <p:nvGrpSpPr>
+        <p:cNvPr id="1" name=""/>
+        <p:cNvGrpSpPr/>
+        <p:nvPr/>
+      </p:nvGrpSpPr>
+      <p:grpSpPr>
+        <a:xfrm>
+          <a:off x="0" y="0"/>
+          <a:ext cx="0" cy="0"/>
+          <a:chOff x="0" y="0"/>
+          <a:chExt cx="0" cy="0"/>
+        </a:xfrm>
+      </p:grpSpPr>
+      <p:sp>
+        <p:nvSpPr>
+          <p:cNvPr id="146" name="Freeform 145"/>
+          <p:cNvSpPr/>
+          <p:nvPr/>
+        </p:nvSpPr>
+        <p:spPr>
+          <a:xfrm flipH="1">
+            <a:off x="5042480" y="-25402"/>
+            <a:ext cx="4107762" cy="6883401"/>
+          </a:xfrm>
+          <a:custGeom>
+            <a:avLst/>
+            <a:gdLst>
+              <a:gd name="connsiteX0" fmla="*/ 3361267 w 3382183"/>
+              <a:gd name="connsiteY0" fmla="*/ 0 h 3982154"/>
+              <a:gd name="connsiteX1" fmla="*/ 3344334 w 3382183"/>
+              <a:gd name="connsiteY1" fmla="*/ 1337733 h 3982154"/>
+              <a:gd name="connsiteX2" fmla="*/ 3014134 w 3382183"/>
+              <a:gd name="connsiteY2" fmla="*/ 2218266 h 3982154"/>
+              <a:gd name="connsiteX3" fmla="*/ 2413000 w 3382183"/>
+              <a:gd name="connsiteY3" fmla="*/ 3031066 h 3982154"/>
+              <a:gd name="connsiteX4" fmla="*/ 1905000 w 3382183"/>
+              <a:gd name="connsiteY4" fmla="*/ 3454400 h 3982154"/>
+              <a:gd name="connsiteX5" fmla="*/ 982134 w 3382183"/>
+              <a:gd name="connsiteY5" fmla="*/ 3818466 h 3982154"/>
+              <a:gd name="connsiteX6" fmla="*/ 169334 w 3382183"/>
+              <a:gd name="connsiteY6" fmla="*/ 3970866 h 3982154"/>
+              <a:gd name="connsiteX7" fmla="*/ 0 w 3382183"/>
+              <a:gd name="connsiteY7" fmla="*/ 3970866 h 3982154"/>
+              <a:gd name="connsiteX8" fmla="*/ 0 w 3382183"/>
+              <a:gd name="connsiteY8" fmla="*/ 3970866 h 3982154"/>
+              <a:gd name="connsiteX9" fmla="*/ 8467 w 3382183"/>
+              <a:gd name="connsiteY9" fmla="*/ 8466 h 3982154"/>
+              <a:gd name="connsiteX10" fmla="*/ 0 w 3382183"/>
+              <a:gd name="connsiteY10" fmla="*/ 16933 h 3982154"/>
+              <a:gd name="connsiteX11" fmla="*/ 3361267 w 3382183"/>
+              <a:gd name="connsiteY11" fmla="*/ 0 h 3982154"/>
+            </a:gdLst>
+            <a:ahLst/>
+            <a:cxnLst>
+              <a:cxn ang="0">
+                <a:pos x="connsiteX0" y="connsiteY0"/>
+              </a:cxn>
+              <a:cxn ang="0">
+                <a:pos x="connsiteX1" y="connsiteY1"/>
+              </a:cxn>
+              <a:cxn ang="0">
+                <a:pos x="connsiteX2" y="connsiteY2"/>
+              </a:cxn>
+              <a:cxn ang="0">
+                <a:pos x="connsiteX3" y="connsiteY3"/>
+              </a:cxn>
+              <a:cxn ang="0">
+                <a:pos x="connsiteX4" y="connsiteY4"/>
+              </a:cxn>
+              <a:cxn ang="0">
+                <a:pos x="connsiteX5" y="connsiteY5"/>
+              </a:cxn>
+              <a:cxn ang="0">
+                <a:pos x="connsiteX6" y="connsiteY6"/>
+              </a:cxn>
+              <a:cxn ang="0">
+                <a:pos x="connsiteX7" y="connsiteY7"/>
+              </a:cxn>
+              <a:cxn ang="0">
+                <a:pos x="connsiteX8" y="connsiteY8"/>
+              </a:cxn>
+              <a:cxn ang="0">
+                <a:pos x="connsiteX9" y="connsiteY9"/>
+              </a:cxn>
+              <a:cxn ang="0">
+                <a:pos x="connsiteX10" y="connsiteY10"/>
+              </a:cxn>
+              <a:cxn ang="0">
+                <a:pos x="connsiteX11" y="connsiteY11"/>
+              </a:cxn>
+            </a:cxnLst>
+            <a:rect l="l" t="t" r="r" b="b"/>
+            <a:pathLst>
+              <a:path w="3382183" h="3982154">
+                <a:moveTo>
+                  <a:pt x="3361267" y="0"/>
+                </a:moveTo>
+                <a:cubicBezTo>
+                  <a:pt x="3381728" y="484011"/>
+                  <a:pt x="3402189" y="968022"/>
+                  <a:pt x="3344334" y="1337733"/>
+                </a:cubicBezTo>
+                <a:cubicBezTo>
+                  <a:pt x="3286479" y="1707444"/>
+                  <a:pt x="3169356" y="1936044"/>
+                  <a:pt x="3014134" y="2218266"/>
+                </a:cubicBezTo>
+                <a:cubicBezTo>
+                  <a:pt x="2858912" y="2500488"/>
+                  <a:pt x="2597856" y="2825044"/>
+                  <a:pt x="2413000" y="3031066"/>
+                </a:cubicBezTo>
+                <a:cubicBezTo>
+                  <a:pt x="2228144" y="3237088"/>
+                  <a:pt x="2143478" y="3323167"/>
+                  <a:pt x="1905000" y="3454400"/>
+                </a:cubicBezTo>
+                <a:cubicBezTo>
+                  <a:pt x="1666522" y="3585633"/>
+                  <a:pt x="1271412" y="3732388"/>
+                  <a:pt x="982134" y="3818466"/>
+                </a:cubicBezTo>
+                <a:cubicBezTo>
+                  <a:pt x="692856" y="3904544"/>
+                  <a:pt x="333023" y="3945466"/>
+                  <a:pt x="169334" y="3970866"/>
+                </a:cubicBezTo>
+                <a:cubicBezTo>
+                  <a:pt x="5645" y="3996266"/>
+                  <a:pt x="0" y="3970866"/>
+                  <a:pt x="0" y="3970866"/>
+                </a:cubicBezTo>
+                <a:lnTo>
+                  <a:pt x="0" y="3970866"/>
+                </a:lnTo>
+                <a:cubicBezTo>
+                  <a:pt x="1411" y="3310466"/>
+                  <a:pt x="8467" y="667455"/>
+                  <a:pt x="8467" y="8466"/>
+                </a:cubicBezTo>
+                <a:lnTo>
+                  <a:pt x="0" y="16933"/>
+                </a:lnTo>
+                <a:lnTo>
+                  <a:pt x="3361267" y="0"/>
+                </a:lnTo>
+                <a:close/>
+              </a:path>
+            </a:pathLst>
+          </a:custGeom>
+          <a:gradFill flip="none" rotWithShape="1">
+            <a:gsLst>
+              <a:gs pos="34000">
+                <a:schemeClr val="bg1">
+                  <a:lumMod val="95000"/>
+                </a:schemeClr>
+              </a:gs>
+              <a:gs pos="0">
+                <a:schemeClr val="dk1">
+                  <a:tint val="50000"/>
+                  <a:satMod val="300000"/>
+                </a:schemeClr>
+              </a:gs>
+              <a:gs pos="11000">
+                <a:schemeClr val="dk1">
+                  <a:tint val="37000"/>
+                  <a:satMod val="300000"/>
+                </a:schemeClr>
+              </a:gs>
+              <a:gs pos="57000">
+                <a:schemeClr val="bg1"/>
+              </a:gs>
+            </a:gsLst>
+            <a:lin ang="2700000" scaled="1"/>
+            <a:tileRect/>
+          </a:gradFill>
+          <a:ln>
+            <a:noFill/>
+          </a:ln>
+          <a:effectLst/>
+        </p:spPr>
+        <p:style>
+          <a:lnRef idx="1">
+            <a:schemeClr val="dk1"/>
+          </a:lnRef>
+          <a:fillRef idx="2">
+            <a:schemeClr val="dk1"/>
+          </a:fillRef>
+          <a:effectRef idx="1">
+            <a:schemeClr val="dk1"/>
+          </a:effectRef>
+          <a:fontRef idx="minor">
+            <a:schemeClr val="dk1"/>
+          </a:fontRef>
+        </p:style>
+        <p:txBody>
+          <a:bodyPr rtlCol="0" anchor="ctr"/>
+          <a:lstStyle/>
+          <a:p>
+            <a:pPr algn="ctr"/>
+            <a:endParaRPr lang="de-DE"/>
+          </a:p>
+        </p:txBody>
+      </p:sp>
+      <p:sp>
+        <p:nvSpPr>
+          <p:cNvPr id="145" name="Freeform 144"/>
+          <p:cNvSpPr/>
+          <p:nvPr/>
+        </p:nvSpPr>
+        <p:spPr>
+          <a:xfrm>
+            <a:off x="-16934" y="-25401"/>
+            <a:ext cx="5127147" cy="4770503"/>
+          </a:xfrm>
+          <a:custGeom>
+            <a:avLst/>
+            <a:gdLst>
+              <a:gd name="connsiteX0" fmla="*/ 3361267 w 3382183"/>
+              <a:gd name="connsiteY0" fmla="*/ 0 h 3982154"/>
+              <a:gd name="connsiteX1" fmla="*/ 3344334 w 3382183"/>
+              <a:gd name="connsiteY1" fmla="*/ 1337733 h 3982154"/>
+              <a:gd name="connsiteX2" fmla="*/ 3014134 w 3382183"/>
+              <a:gd name="connsiteY2" fmla="*/ 2218266 h 3982154"/>
+              <a:gd name="connsiteX3" fmla="*/ 2413000 w 3382183"/>
+              <a:gd name="connsiteY3" fmla="*/ 3031066 h 3982154"/>
+              <a:gd name="connsiteX4" fmla="*/ 1905000 w 3382183"/>
+              <a:gd name="connsiteY4" fmla="*/ 3454400 h 3982154"/>
+              <a:gd name="connsiteX5" fmla="*/ 982134 w 3382183"/>
+              <a:gd name="connsiteY5" fmla="*/ 3818466 h 3982154"/>
+              <a:gd name="connsiteX6" fmla="*/ 169334 w 3382183"/>
+              <a:gd name="connsiteY6" fmla="*/ 3970866 h 3982154"/>
+              <a:gd name="connsiteX7" fmla="*/ 0 w 3382183"/>
+              <a:gd name="connsiteY7" fmla="*/ 3970866 h 3982154"/>
+              <a:gd name="connsiteX8" fmla="*/ 0 w 3382183"/>
+              <a:gd name="connsiteY8" fmla="*/ 3970866 h 3982154"/>
+              <a:gd name="connsiteX9" fmla="*/ 8467 w 3382183"/>
+              <a:gd name="connsiteY9" fmla="*/ 8466 h 3982154"/>
+              <a:gd name="connsiteX10" fmla="*/ 0 w 3382183"/>
+              <a:gd name="connsiteY10" fmla="*/ 16933 h 3982154"/>
+              <a:gd name="connsiteX11" fmla="*/ 3361267 w 3382183"/>
+              <a:gd name="connsiteY11" fmla="*/ 0 h 3982154"/>
+            </a:gdLst>
+            <a:ahLst/>
+            <a:cxnLst>
+              <a:cxn ang="0">
+                <a:pos x="connsiteX0" y="connsiteY0"/>
+              </a:cxn>
+              <a:cxn ang="0">
+                <a:pos x="connsiteX1" y="connsiteY1"/>
+              </a:cxn>
+              <a:cxn ang="0">
+                <a:pos x="connsiteX2" y="connsiteY2"/>
+              </a:cxn>
+              <a:cxn ang="0">
+                <a:pos x="connsiteX3" y="connsiteY3"/>
+              </a:cxn>
+              <a:cxn ang="0">
+                <a:pos x="connsiteX4" y="connsiteY4"/>
+              </a:cxn>
+              <a:cxn ang="0">
+                <a:pos x="connsiteX5" y="connsiteY5"/>
+              </a:cxn>
+              <a:cxn ang="0">
+                <a:pos x="connsiteX6" y="connsiteY6"/>
+              </a:cxn>
+              <a:cxn ang="0">
+                <a:pos x="connsiteX7" y="connsiteY7"/>
+              </a:cxn>
+              <a:cxn ang="0">
+                <a:pos x="connsiteX8" y="connsiteY8"/>
+              </a:cxn>
+              <a:cxn ang="0">
+                <a:pos x="connsiteX9" y="connsiteY9"/>
+              </a:cxn>
+              <a:cxn ang="0">
+                <a:pos x="connsiteX10" y="connsiteY10"/>
+              </a:cxn>
+              <a:cxn ang="0">
+                <a:pos x="connsiteX11" y="connsiteY11"/>
+              </a:cxn>
+            </a:cxnLst>
+            <a:rect l="l" t="t" r="r" b="b"/>
+            <a:pathLst>
+              <a:path w="3382183" h="3982154">
+                <a:moveTo>
+                  <a:pt x="3361267" y="0"/>
+                </a:moveTo>
+                <a:cubicBezTo>
+                  <a:pt x="3381728" y="484011"/>
+                  <a:pt x="3402189" y="968022"/>
+                  <a:pt x="3344334" y="1337733"/>
+                </a:cubicBezTo>
+                <a:cubicBezTo>
+                  <a:pt x="3286479" y="1707444"/>
+                  <a:pt x="3169356" y="1936044"/>
+                  <a:pt x="3014134" y="2218266"/>
+                </a:cubicBezTo>
+                <a:cubicBezTo>
+                  <a:pt x="2858912" y="2500488"/>
+                  <a:pt x="2597856" y="2825044"/>
+                  <a:pt x="2413000" y="3031066"/>
+                </a:cubicBezTo>
+                <a:cubicBezTo>
+                  <a:pt x="2228144" y="3237088"/>
+                  <a:pt x="2143478" y="3323167"/>
+                  <a:pt x="1905000" y="3454400"/>
+                </a:cubicBezTo>
+                <a:cubicBezTo>
+                  <a:pt x="1666522" y="3585633"/>
+                  <a:pt x="1271412" y="3732388"/>
+                  <a:pt x="982134" y="3818466"/>
+                </a:cubicBezTo>
+                <a:cubicBezTo>
+                  <a:pt x="692856" y="3904544"/>
+                  <a:pt x="333023" y="3945466"/>
+                  <a:pt x="169334" y="3970866"/>
+                </a:cubicBezTo>
+                <a:cubicBezTo>
+                  <a:pt x="5645" y="3996266"/>
+                  <a:pt x="0" y="3970866"/>
+                  <a:pt x="0" y="3970866"/>
+                </a:cubicBezTo>
+                <a:lnTo>
+                  <a:pt x="0" y="3970866"/>
+                </a:lnTo>
+                <a:cubicBezTo>
+                  <a:pt x="1411" y="3310466"/>
+                  <a:pt x="8467" y="667455"/>
+                  <a:pt x="8467" y="8466"/>
+                </a:cubicBezTo>
+                <a:lnTo>
+                  <a:pt x="0" y="16933"/>
+                </a:lnTo>
+                <a:lnTo>
+                  <a:pt x="3361267" y="0"/>
+                </a:lnTo>
+                <a:close/>
+              </a:path>
+            </a:pathLst>
+          </a:custGeom>
+          <a:gradFill flip="none" rotWithShape="1">
+            <a:gsLst>
+              <a:gs pos="66944">
+                <a:schemeClr val="bg1">
+                  <a:alpha val="0"/>
+                </a:schemeClr>
+              </a:gs>
+              <a:gs pos="34000">
+                <a:schemeClr val="bg1">
+                  <a:lumMod val="95000"/>
+                </a:schemeClr>
+              </a:gs>
+              <a:gs pos="0">
+                <a:schemeClr val="dk1">
+                  <a:tint val="50000"/>
+                  <a:satMod val="300000"/>
+                </a:schemeClr>
+              </a:gs>
+              <a:gs pos="11000">
+                <a:schemeClr val="dk1">
+                  <a:tint val="37000"/>
+                  <a:satMod val="300000"/>
+                </a:schemeClr>
+              </a:gs>
+              <a:gs pos="55000">
+                <a:schemeClr val="bg1">
+                  <a:alpha val="50000"/>
+                </a:schemeClr>
+              </a:gs>
+            </a:gsLst>
+            <a:lin ang="2700000" scaled="1"/>
+            <a:tileRect/>
+          </a:gradFill>
+          <a:ln>
+            <a:noFill/>
+          </a:ln>
+          <a:effectLst/>
+        </p:spPr>
+        <p:style>
+          <a:lnRef idx="1">
+            <a:schemeClr val="dk1"/>
+          </a:lnRef>
+          <a:fillRef idx="2">
+            <a:schemeClr val="dk1"/>
+          </a:fillRef>
+          <a:effectRef idx="1">
+            <a:schemeClr val="dk1"/>
+          </a:effectRef>
+          <a:fontRef idx="minor">
+            <a:schemeClr val="dk1"/>
+          </a:fontRef>
+        </p:style>
+        <p:txBody>
+          <a:bodyPr rtlCol="0" anchor="ctr"/>
+          <a:lstStyle/>
+          <a:p>
+            <a:pPr algn="ctr"/>
+            <a:endParaRPr lang="de-DE"/>
+          </a:p>
+        </p:txBody>
+      </p:sp>
+      <p:sp>
+        <p:nvSpPr>
+          <p:cNvPr id="121" name="Freeform 120"/>
+          <p:cNvSpPr/>
+          <p:nvPr/>
+        </p:nvSpPr>
+        <p:spPr>
+          <a:xfrm>
+            <a:off x="-25401" y="4343400"/>
+            <a:ext cx="6316641" cy="2581330"/>
+          </a:xfrm>
+          <a:custGeom>
+            <a:avLst/>
+            <a:gdLst>
+              <a:gd name="connsiteX0" fmla="*/ 42333 w 5578906"/>
+              <a:gd name="connsiteY0" fmla="*/ 0 h 2581330"/>
+              <a:gd name="connsiteX1" fmla="*/ 2074333 w 5578906"/>
+              <a:gd name="connsiteY1" fmla="*/ 177800 h 2581330"/>
+              <a:gd name="connsiteX2" fmla="*/ 4199467 w 5578906"/>
+              <a:gd name="connsiteY2" fmla="*/ 778933 h 2581330"/>
+              <a:gd name="connsiteX3" fmla="*/ 5342467 w 5578906"/>
+              <a:gd name="connsiteY3" fmla="*/ 1540933 h 2581330"/>
+              <a:gd name="connsiteX4" fmla="*/ 5562600 w 5578906"/>
+              <a:gd name="connsiteY4" fmla="*/ 2514600 h 2581330"/>
+              <a:gd name="connsiteX5" fmla="*/ 5562600 w 5578906"/>
+              <a:gd name="connsiteY5" fmla="*/ 2497667 h 2581330"/>
+              <a:gd name="connsiteX6" fmla="*/ 0 w 5578906"/>
+              <a:gd name="connsiteY6" fmla="*/ 2497667 h 2581330"/>
+              <a:gd name="connsiteX7" fmla="*/ 0 w 5578906"/>
+              <a:gd name="connsiteY7" fmla="*/ 2497667 h 2581330"/>
+              <a:gd name="connsiteX8" fmla="*/ 42333 w 5578906"/>
+              <a:gd name="connsiteY8" fmla="*/ 0 h 2581330"/>
+            </a:gdLst>
+            <a:ahLst/>
+            <a:cxnLst>
+              <a:cxn ang="0">
+                <a:pos x="connsiteX0" y="connsiteY0"/>
+              </a:cxn>
+              <a:cxn ang="0">
+                <a:pos x="connsiteX1" y="connsiteY1"/>
+              </a:cxn>
+              <a:cxn ang="0">
+                <a:pos x="connsiteX2" y="connsiteY2"/>
+              </a:cxn>
+              <a:cxn ang="0">
+                <a:pos x="connsiteX3" y="connsiteY3"/>
+              </a:cxn>
+              <a:cxn ang="0">
+                <a:pos x="connsiteX4" y="connsiteY4"/>
+              </a:cxn>
+              <a:cxn ang="0">
+                <a:pos x="connsiteX5" y="connsiteY5"/>
+              </a:cxn>
+              <a:cxn ang="0">
+                <a:pos x="connsiteX6" y="connsiteY6"/>
+              </a:cxn>
+              <a:cxn ang="0">
+                <a:pos x="connsiteX7" y="connsiteY7"/>
+              </a:cxn>
+              <a:cxn ang="0">
+                <a:pos x="connsiteX8" y="connsiteY8"/>
+              </a:cxn>
+            </a:cxnLst>
+            <a:rect l="l" t="t" r="r" b="b"/>
+            <a:pathLst>
+              <a:path w="5578906" h="2581330">
+                <a:moveTo>
+                  <a:pt x="42333" y="0"/>
+                </a:moveTo>
+                <a:cubicBezTo>
+                  <a:pt x="711905" y="23989"/>
+                  <a:pt x="1381477" y="47978"/>
+                  <a:pt x="2074333" y="177800"/>
+                </a:cubicBezTo>
+                <a:cubicBezTo>
+                  <a:pt x="2767189" y="307622"/>
+                  <a:pt x="3654778" y="551744"/>
+                  <a:pt x="4199467" y="778933"/>
+                </a:cubicBezTo>
+                <a:cubicBezTo>
+                  <a:pt x="4744156" y="1006122"/>
+                  <a:pt x="5115278" y="1251655"/>
+                  <a:pt x="5342467" y="1540933"/>
+                </a:cubicBezTo>
+                <a:cubicBezTo>
+                  <a:pt x="5569656" y="1830211"/>
+                  <a:pt x="5525911" y="2355144"/>
+                  <a:pt x="5562600" y="2514600"/>
+                </a:cubicBezTo>
+                <a:cubicBezTo>
+                  <a:pt x="5599289" y="2674056"/>
+                  <a:pt x="5562600" y="2497667"/>
+                  <a:pt x="5562600" y="2497667"/>
+                </a:cubicBezTo>
+                <a:lnTo>
+                  <a:pt x="0" y="2497667"/>
+                </a:lnTo>
+                <a:lnTo>
+                  <a:pt x="0" y="2497667"/>
+                </a:lnTo>
+                <a:lnTo>
+                  <a:pt x="42333" y="0"/>
+                </a:lnTo>
+                <a:close/>
+              </a:path>
+            </a:pathLst>
+          </a:custGeom>
+          <a:ln>
+            <a:noFill/>
+          </a:ln>
+        </p:spPr>
+        <p:style>
+          <a:lnRef idx="1">
+            <a:schemeClr val="accent1"/>
+          </a:lnRef>
+          <a:fillRef idx="2">
+            <a:schemeClr val="accent1"/>
+          </a:fillRef>
+          <a:effectRef idx="1">
+            <a:schemeClr val="accent1"/>
+          </a:effectRef>
+          <a:fontRef idx="minor">
+            <a:schemeClr val="dk1"/>
+          </a:fontRef>
+        </p:style>
+        <p:txBody>
+          <a:bodyPr rtlCol="0" anchor="ctr"/>
+          <a:lstStyle/>
+          <a:p>
+            <a:pPr algn="ctr"/>
+            <a:endParaRPr lang="de-DE"/>
+          </a:p>
+        </p:txBody>
+      </p:sp>
+      <p:cxnSp>
+        <p:nvCxnSpPr>
+          <p:cNvPr id="124" name="Curved Connector 123"/>
+          <p:cNvCxnSpPr>
+            <a:stCxn id="18" idx="1"/>
+            <a:endCxn id="4" idx="0"/>
+          </p:cNvCxnSpPr>
+          <p:nvPr/>
+        </p:nvCxnSpPr>
+        <p:spPr>
+          <a:xfrm rot="10800000" flipV="1">
+            <a:off x="1969338" y="1815302"/>
+            <a:ext cx="2006342" cy="3225566"/>
+          </a:xfrm>
+          <a:prstGeom prst="curvedConnector2">
+            <a:avLst/>
+          </a:prstGeom>
+          <a:ln>
+            <a:prstDash val="dash"/>
+            <a:headEnd type="none" w="med" len="med"/>
+            <a:tailEnd type="arrow"/>
+          </a:ln>
+        </p:spPr>
+        <p:style>
+          <a:lnRef idx="2">
+            <a:schemeClr val="dk1"/>
+          </a:lnRef>
+          <a:fillRef idx="0">
+            <a:schemeClr val="dk1"/>
+          </a:fillRef>
+          <a:effectRef idx="1">
+            <a:schemeClr val="dk1"/>
+          </a:effectRef>
+          <a:fontRef idx="minor">
+            <a:schemeClr val="tx1"/>
+          </a:fontRef>
+        </p:style>
+      </p:cxnSp>
+      <p:cxnSp>
+        <p:nvCxnSpPr>
+          <p:cNvPr id="132" name="Curved Connector 131"/>
+          <p:cNvCxnSpPr>
+            <a:stCxn id="15" idx="1"/>
+            <a:endCxn id="4" idx="0"/>
+          </p:cNvCxnSpPr>
+          <p:nvPr/>
+        </p:nvCxnSpPr>
+        <p:spPr>
+          <a:xfrm rot="10800000" flipV="1">
+            <a:off x="1969338" y="1796534"/>
+            <a:ext cx="4527476" cy="3244334"/>
+          </a:xfrm>
+          <a:prstGeom prst="curvedConnector2">
+            <a:avLst/>
+          </a:prstGeom>
+          <a:ln>
+            <a:prstDash val="dash"/>
+            <a:headEnd type="none" w="med" len="med"/>
+            <a:tailEnd type="arrow"/>
+          </a:ln>
+        </p:spPr>
+        <p:style>
+          <a:lnRef idx="2">
+            <a:schemeClr val="dk1"/>
+          </a:lnRef>
+          <a:fillRef idx="0">
+            <a:schemeClr val="dk1"/>
+          </a:fillRef>
+          <a:effectRef idx="1">
+            <a:schemeClr val="dk1"/>
+          </a:effectRef>
+          <a:fontRef idx="minor">
+            <a:schemeClr val="tx1"/>
+          </a:fontRef>
+        </p:style>
+      </p:cxnSp>
+      <p:sp>
+        <p:nvSpPr>
+          <p:cNvPr id="137" name="Rectangle 136"/>
+          <p:cNvSpPr/>
+          <p:nvPr/>
+        </p:nvSpPr>
+        <p:spPr>
+          <a:xfrm>
+            <a:off x="3975680" y="1295400"/>
+            <a:ext cx="1066800" cy="1016001"/>
+          </a:xfrm>
+          <a:prstGeom prst="rect">
+            <a:avLst/>
+          </a:prstGeom>
+          <a:solidFill>
+            <a:schemeClr val="bg1"/>
+          </a:solidFill>
+          <a:ln>
+            <a:noFill/>
+          </a:ln>
+        </p:spPr>
+        <p:style>
+          <a:lnRef idx="2">
+            <a:schemeClr val="accent1">
+              <a:shade val="50000"/>
+            </a:schemeClr>
+          </a:lnRef>
+          <a:fillRef idx="1">
+            <a:schemeClr val="accent1"/>
+          </a:fillRef>
+          <a:effectRef idx="0">
+            <a:schemeClr val="accent1"/>
+          </a:effectRef>
+          <a:fontRef idx="minor">
+            <a:schemeClr val="lt1"/>
+          </a:fontRef>
+        </p:style>
+        <p:txBody>
+          <a:bodyPr rtlCol="0" anchor="ctr"/>
+          <a:lstStyle/>
+          <a:p>
+            <a:pPr algn="ctr"/>
+            <a:endParaRPr lang="de-DE"/>
+          </a:p>
+        </p:txBody>
+      </p:sp>
+      <p:sp>
+        <p:nvSpPr>
+          <p:cNvPr id="4" name="TextBox 3"/>
+          <p:cNvSpPr txBox="1"/>
+          <p:nvPr/>
+        </p:nvSpPr>
+        <p:spPr>
+          <a:xfrm>
+            <a:off x="1465033" y="5040868"/>
+            <a:ext cx="1008609" cy="369332"/>
+          </a:xfrm>
+          <a:prstGeom prst="rect">
+            <a:avLst/>
+          </a:prstGeom>
+        </p:spPr>
+        <p:style>
+          <a:lnRef idx="2">
+            <a:schemeClr val="dk1"/>
+          </a:lnRef>
+          <a:fillRef idx="1">
+            <a:schemeClr val="lt1"/>
+          </a:fillRef>
+          <a:effectRef idx="0">
+            <a:schemeClr val="dk1"/>
+          </a:effectRef>
+          <a:fontRef idx="minor">
+            <a:schemeClr val="dk1"/>
+          </a:fontRef>
+        </p:style>
+        <p:txBody>
+          <a:bodyPr wrap="none" rtlCol="0">
+            <a:spAutoFit/>
+          </a:bodyPr>
+          <a:lstStyle/>
+          <a:p>
+            <a:r>
+              <a:rPr lang="de-DE" dirty="0" smtClean="0"/>
+              <a:t>nif:Word</a:t>
+            </a:r>
+            <a:endParaRPr lang="de-DE" dirty="0"/>
+          </a:p>
+        </p:txBody>
+      </p:sp>
+      <p:sp>
+        <p:nvSpPr>
+          <p:cNvPr id="5" name="TextBox 4"/>
+          <p:cNvSpPr txBox="1"/>
+          <p:nvPr/>
+        </p:nvSpPr>
+        <p:spPr>
+          <a:xfrm>
+            <a:off x="3823343" y="6107667"/>
+            <a:ext cx="1358257" cy="369332"/>
+          </a:xfrm>
+          <a:prstGeom prst="rect">
+            <a:avLst/>
+          </a:prstGeom>
+        </p:spPr>
+        <p:style>
+          <a:lnRef idx="2">
+            <a:schemeClr val="dk1"/>
+          </a:lnRef>
+          <a:fillRef idx="1">
+            <a:schemeClr val="lt1"/>
+          </a:fillRef>
+          <a:effectRef idx="0">
+            <a:schemeClr val="dk1"/>
+          </a:effectRef>
+          <a:fontRef idx="minor">
+            <a:schemeClr val="dk1"/>
+          </a:fontRef>
+        </p:style>
+        <p:txBody>
+          <a:bodyPr wrap="none" rtlCol="0">
+            <a:spAutoFit/>
+          </a:bodyPr>
+          <a:lstStyle/>
+          <a:p>
+            <a:r>
+              <a:rPr lang="de-DE" dirty="0" smtClean="0"/>
+              <a:t>nif:Sentence</a:t>
+            </a:r>
+            <a:endParaRPr lang="de-DE" dirty="0"/>
+          </a:p>
+        </p:txBody>
+      </p:sp>
+      <p:sp>
+        <p:nvSpPr>
+          <p:cNvPr id="6" name="TextBox 5"/>
+          <p:cNvSpPr txBox="1"/>
+          <p:nvPr/>
+        </p:nvSpPr>
+        <p:spPr>
+          <a:xfrm>
+            <a:off x="228600" y="651932"/>
+            <a:ext cx="2253822" cy="646331"/>
+          </a:xfrm>
+          <a:prstGeom prst="rect">
+            <a:avLst/>
+          </a:prstGeom>
+        </p:spPr>
+        <p:style>
+          <a:lnRef idx="2">
+            <a:schemeClr val="dk1"/>
+          </a:lnRef>
+          <a:fillRef idx="1">
+            <a:schemeClr val="lt1"/>
+          </a:fillRef>
+          <a:effectRef idx="0">
+            <a:schemeClr val="dk1"/>
+          </a:effectRef>
+          <a:fontRef idx="minor">
+            <a:schemeClr val="dk1"/>
+          </a:fontRef>
+        </p:style>
+        <p:txBody>
+          <a:bodyPr wrap="none" rtlCol="0">
+            <a:spAutoFit/>
+          </a:bodyPr>
+          <a:lstStyle/>
+          <a:p>
+            <a:r>
+              <a:rPr lang="de-DE" dirty="0" smtClean="0"/>
+              <a:t>conll:ColumnMapping</a:t>
+            </a:r>
+            <a:endParaRPr lang="de-DE" i="1" dirty="0" smtClean="0"/>
+          </a:p>
+          <a:p>
+            <a:r>
+              <a:rPr lang="de-DE" i="1" dirty="0" smtClean="0"/>
+              <a:t>conll:column xsd:int</a:t>
+            </a:r>
+            <a:endParaRPr lang="de-DE" i="1" dirty="0"/>
+          </a:p>
+        </p:txBody>
+      </p:sp>
+      <p:sp>
+        <p:nvSpPr>
+          <p:cNvPr id="7" name="TextBox 6"/>
+          <p:cNvSpPr txBox="1"/>
+          <p:nvPr/>
+        </p:nvSpPr>
+        <p:spPr>
+          <a:xfrm>
+            <a:off x="670711" y="2069068"/>
+            <a:ext cx="1341714" cy="369332"/>
+          </a:xfrm>
+          <a:prstGeom prst="rect">
+            <a:avLst/>
+          </a:prstGeom>
+        </p:spPr>
+        <p:style>
+          <a:lnRef idx="2">
+            <a:schemeClr val="dk1"/>
+          </a:lnRef>
+          <a:fillRef idx="1">
+            <a:schemeClr val="lt1"/>
+          </a:fillRef>
+          <a:effectRef idx="0">
+            <a:schemeClr val="dk1"/>
+          </a:effectRef>
+          <a:fontRef idx="minor">
+            <a:schemeClr val="dk1"/>
+          </a:fontRef>
+        </p:style>
+        <p:txBody>
+          <a:bodyPr wrap="none" rtlCol="0">
+            <a:spAutoFit/>
+          </a:bodyPr>
+          <a:lstStyle/>
+          <a:p>
+            <a:r>
+              <a:rPr lang="de-DE" dirty="0" smtClean="0"/>
+              <a:t>conll:Dialect</a:t>
+            </a:r>
+            <a:endParaRPr lang="de-DE" dirty="0"/>
+          </a:p>
+        </p:txBody>
+      </p:sp>
+      <p:cxnSp>
+        <p:nvCxnSpPr>
+          <p:cNvPr id="9" name="Elbow Connector 8"/>
+          <p:cNvCxnSpPr>
+            <a:stCxn id="5" idx="1"/>
+            <a:endCxn id="5" idx="2"/>
+          </p:cNvCxnSpPr>
+          <p:nvPr/>
+        </p:nvCxnSpPr>
+        <p:spPr>
+          <a:xfrm rot="10800000" flipH="1" flipV="1">
+            <a:off x="3823342" y="6292333"/>
+            <a:ext cx="679129" cy="184666"/>
+          </a:xfrm>
+          <a:prstGeom prst="bentConnector4">
+            <a:avLst>
+              <a:gd name="adj1" fmla="val -33661"/>
+              <a:gd name="adj2" fmla="val 223791"/>
+            </a:avLst>
+          </a:prstGeom>
+          <a:ln>
+            <a:tailEnd type="arrow"/>
+          </a:ln>
+        </p:spPr>
+        <p:style>
+          <a:lnRef idx="2">
+            <a:schemeClr val="dk1"/>
+          </a:lnRef>
+          <a:fillRef idx="0">
+            <a:schemeClr val="dk1"/>
+          </a:fillRef>
+          <a:effectRef idx="1">
+            <a:schemeClr val="dk1"/>
+          </a:effectRef>
+          <a:fontRef idx="minor">
+            <a:schemeClr val="tx1"/>
+          </a:fontRef>
+        </p:style>
+      </p:cxnSp>
+      <p:sp>
+        <p:nvSpPr>
+          <p:cNvPr id="10" name="TextBox 9"/>
+          <p:cNvSpPr txBox="1"/>
+          <p:nvPr/>
+        </p:nvSpPr>
+        <p:spPr>
+          <a:xfrm>
+            <a:off x="2378520" y="6059269"/>
+            <a:ext cx="1050480" cy="646331"/>
+          </a:xfrm>
+          <a:prstGeom prst="rect">
+            <a:avLst/>
+          </a:prstGeom>
+          <a:noFill/>
+        </p:spPr>
+        <p:txBody>
+          <a:bodyPr wrap="none" rtlCol="0">
+            <a:spAutoFit/>
+          </a:bodyPr>
+          <a:lstStyle/>
+          <a:p>
+            <a:pPr algn="ctr"/>
+            <a:r>
+              <a:rPr lang="de-DE" dirty="0" smtClean="0"/>
+              <a:t>nif:next</a:t>
+            </a:r>
+          </a:p>
+          <a:p>
+            <a:pPr algn="ctr"/>
+            <a:r>
+              <a:rPr lang="de-DE" dirty="0" smtClean="0"/>
+              <a:t>Sentence</a:t>
+            </a:r>
+            <a:endParaRPr lang="de-DE" dirty="0"/>
+          </a:p>
+        </p:txBody>
+      </p:sp>
+      <p:cxnSp>
+        <p:nvCxnSpPr>
+          <p:cNvPr id="12" name="Elbow Connector 11"/>
+          <p:cNvCxnSpPr>
+            <a:stCxn id="4" idx="1"/>
+            <a:endCxn id="4" idx="2"/>
+          </p:cNvCxnSpPr>
+          <p:nvPr/>
+        </p:nvCxnSpPr>
+        <p:spPr>
+          <a:xfrm rot="10800000" flipH="1" flipV="1">
+            <a:off x="1465032" y="5225534"/>
+            <a:ext cx="504305" cy="184666"/>
+          </a:xfrm>
+          <a:prstGeom prst="bentConnector4">
+            <a:avLst>
+              <a:gd name="adj1" fmla="val -45330"/>
+              <a:gd name="adj2" fmla="val 223791"/>
+            </a:avLst>
+          </a:prstGeom>
+          <a:ln>
+            <a:tailEnd type="arrow"/>
+          </a:ln>
+        </p:spPr>
+        <p:style>
+          <a:lnRef idx="2">
+            <a:schemeClr val="dk1"/>
+          </a:lnRef>
+          <a:fillRef idx="0">
+            <a:schemeClr val="dk1"/>
+          </a:fillRef>
+          <a:effectRef idx="1">
+            <a:schemeClr val="dk1"/>
+          </a:effectRef>
+          <a:fontRef idx="minor">
+            <a:schemeClr val="tx1"/>
+          </a:fontRef>
+        </p:style>
+      </p:cxnSp>
+      <p:sp>
+        <p:nvSpPr>
+          <p:cNvPr id="13" name="TextBox 12"/>
+          <p:cNvSpPr txBox="1"/>
+          <p:nvPr/>
+        </p:nvSpPr>
+        <p:spPr>
+          <a:xfrm>
+            <a:off x="228600" y="4916269"/>
+            <a:ext cx="903261" cy="646331"/>
+          </a:xfrm>
+          <a:prstGeom prst="rect">
+            <a:avLst/>
+          </a:prstGeom>
+          <a:noFill/>
+        </p:spPr>
+        <p:txBody>
+          <a:bodyPr wrap="none" rtlCol="0">
+            <a:spAutoFit/>
+          </a:bodyPr>
+          <a:lstStyle/>
+          <a:p>
+            <a:pPr algn="ctr"/>
+            <a:r>
+              <a:rPr lang="de-DE" dirty="0" smtClean="0"/>
+              <a:t>nif:next</a:t>
+            </a:r>
+          </a:p>
+          <a:p>
+            <a:pPr algn="ctr"/>
+            <a:r>
+              <a:rPr lang="de-DE" dirty="0" smtClean="0"/>
+              <a:t>Word</a:t>
+            </a:r>
+            <a:endParaRPr lang="de-DE" dirty="0"/>
+          </a:p>
+        </p:txBody>
+      </p:sp>
+      <p:grpSp>
+        <p:nvGrpSpPr>
+          <p:cNvPr id="20" name="Group 19"/>
+          <p:cNvGrpSpPr/>
+          <p:nvPr/>
+        </p:nvGrpSpPr>
+        <p:grpSpPr>
+          <a:xfrm>
+            <a:off x="6477000" y="1334869"/>
+            <a:ext cx="1033441" cy="923330"/>
+            <a:chOff x="7391400" y="436879"/>
+            <a:chExt cx="1033441" cy="923330"/>
+          </a:xfrm>
+        </p:grpSpPr>
+        <p:sp>
+          <p:nvSpPr>
+            <p:cNvPr id="19" name="Rounded Rectangle 18"/>
+            <p:cNvSpPr/>
+            <p:nvPr/>
+          </p:nvSpPr>
+          <p:spPr>
+            <a:xfrm>
+              <a:off x="7391400" y="441957"/>
+              <a:ext cx="1033441" cy="918252"/>
+            </a:xfrm>
+            <a:prstGeom prst="roundRect">
+              <a:avLst/>
+            </a:prstGeom>
+            <a:solidFill>
+              <a:schemeClr val="bg1"/>
+            </a:solidFill>
+          </p:spPr>
+          <p:style>
+            <a:lnRef idx="2">
+              <a:schemeClr val="dk1"/>
+            </a:lnRef>
+            <a:fillRef idx="1">
+              <a:schemeClr val="lt1"/>
+            </a:fillRef>
+            <a:effectRef idx="0">
+              <a:schemeClr val="dk1"/>
+            </a:effectRef>
+            <a:fontRef idx="minor">
+              <a:schemeClr val="dk1"/>
+            </a:fontRef>
+          </p:style>
+          <p:txBody>
+            <a:bodyPr rtlCol="0" anchor="ctr"/>
+            <a:lstStyle/>
+            <a:p>
+              <a:pPr algn="ctr"/>
+              <a:endParaRPr lang="de-DE"/>
+            </a:p>
+          </p:txBody>
+        </p:sp>
+        <p:sp>
+          <p:nvSpPr>
+            <p:cNvPr id="15" name="TextBox 14"/>
+            <p:cNvSpPr txBox="1"/>
+            <p:nvPr/>
+          </p:nvSpPr>
+          <p:spPr>
+            <a:xfrm>
+              <a:off x="7411214" y="436879"/>
+              <a:ext cx="1000081" cy="923330"/>
+            </a:xfrm>
+            <a:prstGeom prst="rect">
+              <a:avLst/>
+            </a:prstGeom>
+            <a:noFill/>
+            <a:ln>
+              <a:noFill/>
+            </a:ln>
+          </p:spPr>
+          <p:style>
+            <a:lnRef idx="2">
+              <a:schemeClr val="dk1"/>
+            </a:lnRef>
+            <a:fillRef idx="1">
+              <a:schemeClr val="lt1"/>
+            </a:fillRef>
+            <a:effectRef idx="0">
+              <a:schemeClr val="dk1"/>
+            </a:effectRef>
+            <a:fontRef idx="minor">
+              <a:schemeClr val="dk1"/>
+            </a:fontRef>
+          </p:style>
+          <p:txBody>
+            <a:bodyPr wrap="none" rtlCol="0">
+              <a:spAutoFit/>
+            </a:bodyPr>
+            <a:lstStyle/>
+            <a:p>
+              <a:pPr algn="ctr"/>
+              <a:r>
+                <a:rPr lang="de-DE" dirty="0" smtClean="0"/>
+                <a:t>conll:</a:t>
+              </a:r>
+            </a:p>
+            <a:p>
+              <a:pPr algn="ctr"/>
+              <a:r>
+                <a:rPr lang="de-DE" dirty="0" smtClean="0"/>
+                <a:t>Object</a:t>
+              </a:r>
+            </a:p>
+            <a:p>
+              <a:pPr algn="ctr"/>
+              <a:r>
+                <a:rPr lang="de-DE" dirty="0" smtClean="0"/>
+                <a:t>Property</a:t>
+              </a:r>
+            </a:p>
+          </p:txBody>
+        </p:sp>
+      </p:grpSp>
+      <p:grpSp>
+        <p:nvGrpSpPr>
+          <p:cNvPr id="21" name="Group 20"/>
+          <p:cNvGrpSpPr/>
+          <p:nvPr/>
+        </p:nvGrpSpPr>
+        <p:grpSpPr>
+          <a:xfrm>
+            <a:off x="5314640" y="2439539"/>
+            <a:ext cx="1033441" cy="646331"/>
+            <a:chOff x="7391400" y="436879"/>
+            <a:chExt cx="1033441" cy="923330"/>
+          </a:xfrm>
+        </p:grpSpPr>
+        <p:sp>
+          <p:nvSpPr>
+            <p:cNvPr id="22" name="TextBox 21"/>
+            <p:cNvSpPr txBox="1"/>
+            <p:nvPr/>
+          </p:nvSpPr>
+          <p:spPr>
+            <a:xfrm>
+              <a:off x="7554073" y="436879"/>
+              <a:ext cx="714363" cy="646331"/>
+            </a:xfrm>
+            <a:prstGeom prst="rect">
+              <a:avLst/>
+            </a:prstGeom>
+            <a:ln>
+              <a:noFill/>
+            </a:ln>
+          </p:spPr>
+          <p:style>
+            <a:lnRef idx="2">
+              <a:schemeClr val="dk1"/>
+            </a:lnRef>
+            <a:fillRef idx="1">
+              <a:schemeClr val="lt1"/>
+            </a:fillRef>
+            <a:effectRef idx="0">
+              <a:schemeClr val="dk1"/>
+            </a:effectRef>
+            <a:fontRef idx="minor">
+              <a:schemeClr val="dk1"/>
+            </a:fontRef>
+          </p:style>
+          <p:txBody>
+            <a:bodyPr wrap="none" rtlCol="0">
+              <a:spAutoFit/>
+            </a:bodyPr>
+            <a:lstStyle/>
+            <a:p>
+              <a:pPr algn="ctr"/>
+              <a:r>
+                <a:rPr lang="de-DE" dirty="0" smtClean="0"/>
+                <a:t>conll:</a:t>
+              </a:r>
+            </a:p>
+            <a:p>
+              <a:pPr algn="ctr"/>
+              <a:r>
+                <a:rPr lang="de-DE" dirty="0" smtClean="0"/>
+                <a:t>HEAD</a:t>
+              </a:r>
+            </a:p>
+          </p:txBody>
+        </p:sp>
+        <p:sp>
+          <p:nvSpPr>
+            <p:cNvPr id="23" name="Rounded Rectangle 22"/>
+            <p:cNvSpPr/>
+            <p:nvPr/>
+          </p:nvSpPr>
+          <p:spPr>
+            <a:xfrm>
+              <a:off x="7391400" y="441957"/>
+              <a:ext cx="1033441" cy="918252"/>
+            </a:xfrm>
+            <a:prstGeom prst="roundRect">
+              <a:avLst/>
+            </a:prstGeom>
+            <a:noFill/>
+          </p:spPr>
+          <p:style>
+            <a:lnRef idx="2">
+              <a:schemeClr val="dk1"/>
+            </a:lnRef>
+            <a:fillRef idx="1">
+              <a:schemeClr val="lt1"/>
+            </a:fillRef>
+            <a:effectRef idx="0">
+              <a:schemeClr val="dk1"/>
+            </a:effectRef>
+            <a:fontRef idx="minor">
+              <a:schemeClr val="dk1"/>
+            </a:fontRef>
+          </p:style>
+          <p:txBody>
+            <a:bodyPr rtlCol="0" anchor="ctr"/>
+            <a:lstStyle/>
+            <a:p>
+              <a:pPr algn="ctr"/>
+              <a:endParaRPr lang="de-DE"/>
+            </a:p>
+          </p:txBody>
+        </p:sp>
+      </p:grpSp>
+      <p:grpSp>
+        <p:nvGrpSpPr>
+          <p:cNvPr id="24" name="Group 23"/>
+          <p:cNvGrpSpPr/>
+          <p:nvPr/>
+        </p:nvGrpSpPr>
+        <p:grpSpPr>
+          <a:xfrm>
+            <a:off x="7620000" y="2438400"/>
+            <a:ext cx="1495506" cy="646331"/>
+            <a:chOff x="7316605" y="436879"/>
+            <a:chExt cx="1189301" cy="923330"/>
+          </a:xfrm>
+        </p:grpSpPr>
+        <p:sp>
+          <p:nvSpPr>
+            <p:cNvPr id="26" name="Rounded Rectangle 25"/>
+            <p:cNvSpPr/>
+            <p:nvPr/>
+          </p:nvSpPr>
+          <p:spPr>
+            <a:xfrm>
+              <a:off x="7391400" y="441957"/>
+              <a:ext cx="1033441" cy="918252"/>
+            </a:xfrm>
+            <a:prstGeom prst="roundRect">
+              <a:avLst/>
+            </a:prstGeom>
+            <a:solidFill>
+              <a:schemeClr val="bg1"/>
+            </a:solidFill>
+          </p:spPr>
+          <p:style>
+            <a:lnRef idx="2">
+              <a:schemeClr val="dk1"/>
+            </a:lnRef>
+            <a:fillRef idx="1">
+              <a:schemeClr val="lt1"/>
+            </a:fillRef>
+            <a:effectRef idx="0">
+              <a:schemeClr val="dk1"/>
+            </a:effectRef>
+            <a:fontRef idx="minor">
+              <a:schemeClr val="dk1"/>
+            </a:fontRef>
+          </p:style>
+          <p:txBody>
+            <a:bodyPr rtlCol="0" anchor="ctr"/>
+            <a:lstStyle/>
+            <a:p>
+              <a:pPr algn="ctr"/>
+              <a:endParaRPr lang="de-DE"/>
+            </a:p>
+          </p:txBody>
+        </p:sp>
+        <p:sp>
+          <p:nvSpPr>
+            <p:cNvPr id="25" name="TextBox 24"/>
+            <p:cNvSpPr txBox="1"/>
+            <p:nvPr/>
+          </p:nvSpPr>
+          <p:spPr>
+            <a:xfrm>
+              <a:off x="7316605" y="436879"/>
+              <a:ext cx="1189301" cy="923330"/>
+            </a:xfrm>
+            <a:prstGeom prst="rect">
+              <a:avLst/>
+            </a:prstGeom>
+            <a:noFill/>
+            <a:ln>
+              <a:noFill/>
+            </a:ln>
+          </p:spPr>
+          <p:style>
+            <a:lnRef idx="2">
+              <a:schemeClr val="dk1"/>
+            </a:lnRef>
+            <a:fillRef idx="1">
+              <a:schemeClr val="lt1"/>
+            </a:fillRef>
+            <a:effectRef idx="0">
+              <a:schemeClr val="dk1"/>
+            </a:effectRef>
+            <a:fontRef idx="minor">
+              <a:schemeClr val="dk1"/>
+            </a:fontRef>
+          </p:style>
+          <p:txBody>
+            <a:bodyPr wrap="none" rtlCol="0">
+              <a:spAutoFit/>
+            </a:bodyPr>
+            <a:lstStyle/>
+            <a:p>
+              <a:pPr algn="ctr"/>
+              <a:r>
+                <a:rPr lang="de-DE" dirty="0" smtClean="0"/>
+                <a:t>conll:</a:t>
+              </a:r>
+            </a:p>
+            <a:p>
+              <a:pPr algn="ctr"/>
+              <a:r>
+                <a:rPr lang="de-DE" dirty="0" smtClean="0"/>
+                <a:t>arguments</a:t>
+              </a:r>
+            </a:p>
+          </p:txBody>
+        </p:sp>
+      </p:grpSp>
+      <p:grpSp>
+        <p:nvGrpSpPr>
+          <p:cNvPr id="27" name="Group 26"/>
+          <p:cNvGrpSpPr/>
+          <p:nvPr/>
+        </p:nvGrpSpPr>
+        <p:grpSpPr>
+          <a:xfrm>
+            <a:off x="7006283" y="4156975"/>
+            <a:ext cx="1299517" cy="369332"/>
+            <a:chOff x="7391400" y="436879"/>
+            <a:chExt cx="1033441" cy="923330"/>
+          </a:xfrm>
+        </p:grpSpPr>
+        <p:sp>
+          <p:nvSpPr>
+            <p:cNvPr id="28" name="TextBox 27"/>
+            <p:cNvSpPr txBox="1"/>
+            <p:nvPr/>
+          </p:nvSpPr>
+          <p:spPr>
+            <a:xfrm>
+              <a:off x="7536467" y="436879"/>
+              <a:ext cx="749576" cy="527617"/>
+            </a:xfrm>
+            <a:prstGeom prst="rect">
+              <a:avLst/>
+            </a:prstGeom>
+            <a:ln>
+              <a:noFill/>
+            </a:ln>
+          </p:spPr>
+          <p:style>
+            <a:lnRef idx="2">
+              <a:schemeClr val="dk1"/>
+            </a:lnRef>
+            <a:fillRef idx="1">
+              <a:schemeClr val="lt1"/>
+            </a:fillRef>
+            <a:effectRef idx="0">
+              <a:schemeClr val="dk1"/>
+            </a:effectRef>
+            <a:fontRef idx="minor">
+              <a:schemeClr val="dk1"/>
+            </a:fontRef>
+          </p:style>
+          <p:txBody>
+            <a:bodyPr wrap="none" rtlCol="0">
+              <a:spAutoFit/>
+            </a:bodyPr>
+            <a:lstStyle/>
+            <a:p>
+              <a:pPr algn="ctr"/>
+              <a:r>
+                <a:rPr lang="de-DE" dirty="0" smtClean="0"/>
+                <a:t>conll:A0</a:t>
+              </a:r>
+            </a:p>
+          </p:txBody>
+        </p:sp>
+        <p:sp>
+          <p:nvSpPr>
+            <p:cNvPr id="29" name="Rounded Rectangle 28"/>
+            <p:cNvSpPr/>
+            <p:nvPr/>
+          </p:nvSpPr>
+          <p:spPr>
+            <a:xfrm>
+              <a:off x="7391400" y="441957"/>
+              <a:ext cx="1033441" cy="918252"/>
+            </a:xfrm>
+            <a:prstGeom prst="roundRect">
+              <a:avLst/>
+            </a:prstGeom>
+            <a:noFill/>
+          </p:spPr>
+          <p:style>
+            <a:lnRef idx="2">
+              <a:schemeClr val="dk1"/>
+            </a:lnRef>
+            <a:fillRef idx="1">
+              <a:schemeClr val="lt1"/>
+            </a:fillRef>
+            <a:effectRef idx="0">
+              <a:schemeClr val="dk1"/>
+            </a:effectRef>
+            <a:fontRef idx="minor">
+              <a:schemeClr val="dk1"/>
+            </a:fontRef>
+          </p:style>
+          <p:txBody>
+            <a:bodyPr rtlCol="0" anchor="ctr"/>
+            <a:lstStyle/>
+            <a:p>
+              <a:pPr algn="ctr"/>
+              <a:endParaRPr lang="de-DE"/>
+            </a:p>
+          </p:txBody>
+        </p:sp>
+      </p:grpSp>
+      <p:grpSp>
+        <p:nvGrpSpPr>
+          <p:cNvPr id="30" name="Group 29"/>
+          <p:cNvGrpSpPr/>
+          <p:nvPr/>
+        </p:nvGrpSpPr>
+        <p:grpSpPr>
+          <a:xfrm>
+            <a:off x="7006283" y="4688774"/>
+            <a:ext cx="1299517" cy="369332"/>
+            <a:chOff x="7391400" y="436879"/>
+            <a:chExt cx="1033441" cy="923330"/>
+          </a:xfrm>
+        </p:grpSpPr>
+        <p:sp>
+          <p:nvSpPr>
+            <p:cNvPr id="31" name="TextBox 30"/>
+            <p:cNvSpPr txBox="1"/>
+            <p:nvPr/>
+          </p:nvSpPr>
+          <p:spPr>
+            <a:xfrm>
+              <a:off x="7536468" y="436879"/>
+              <a:ext cx="749576" cy="923330"/>
+            </a:xfrm>
+            <a:prstGeom prst="rect">
+              <a:avLst/>
+            </a:prstGeom>
+            <a:ln>
+              <a:noFill/>
+            </a:ln>
+          </p:spPr>
+          <p:style>
+            <a:lnRef idx="2">
+              <a:schemeClr val="dk1"/>
+            </a:lnRef>
+            <a:fillRef idx="1">
+              <a:schemeClr val="lt1"/>
+            </a:fillRef>
+            <a:effectRef idx="0">
+              <a:schemeClr val="dk1"/>
+            </a:effectRef>
+            <a:fontRef idx="minor">
+              <a:schemeClr val="dk1"/>
+            </a:fontRef>
+          </p:style>
+          <p:txBody>
+            <a:bodyPr wrap="none" rtlCol="0">
+              <a:spAutoFit/>
+            </a:bodyPr>
+            <a:lstStyle/>
+            <a:p>
+              <a:pPr algn="ctr"/>
+              <a:r>
+                <a:rPr lang="de-DE" dirty="0" smtClean="0"/>
+                <a:t>conll:A1</a:t>
+              </a:r>
+            </a:p>
+          </p:txBody>
+        </p:sp>
+        <p:sp>
+          <p:nvSpPr>
+            <p:cNvPr id="32" name="Rounded Rectangle 31"/>
+            <p:cNvSpPr/>
+            <p:nvPr/>
+          </p:nvSpPr>
+          <p:spPr>
+            <a:xfrm>
+              <a:off x="7391400" y="441957"/>
+              <a:ext cx="1033441" cy="918252"/>
+            </a:xfrm>
+            <a:prstGeom prst="roundRect">
+              <a:avLst/>
+            </a:prstGeom>
+            <a:noFill/>
+          </p:spPr>
+          <p:style>
+            <a:lnRef idx="2">
+              <a:schemeClr val="dk1"/>
+            </a:lnRef>
+            <a:fillRef idx="1">
+              <a:schemeClr val="lt1"/>
+            </a:fillRef>
+            <a:effectRef idx="0">
+              <a:schemeClr val="dk1"/>
+            </a:effectRef>
+            <a:fontRef idx="minor">
+              <a:schemeClr val="dk1"/>
+            </a:fontRef>
+          </p:style>
+          <p:txBody>
+            <a:bodyPr rtlCol="0" anchor="ctr"/>
+            <a:lstStyle/>
+            <a:p>
+              <a:pPr algn="ctr"/>
+              <a:endParaRPr lang="de-DE"/>
+            </a:p>
+          </p:txBody>
+        </p:sp>
+      </p:grpSp>
+      <p:grpSp>
+        <p:nvGrpSpPr>
+          <p:cNvPr id="33" name="Group 32"/>
+          <p:cNvGrpSpPr/>
+          <p:nvPr/>
+        </p:nvGrpSpPr>
+        <p:grpSpPr>
+          <a:xfrm>
+            <a:off x="6586669" y="5184338"/>
+            <a:ext cx="1871531" cy="369332"/>
+            <a:chOff x="7306372" y="436879"/>
+            <a:chExt cx="1209774" cy="923330"/>
+          </a:xfrm>
+        </p:grpSpPr>
+        <p:sp>
+          <p:nvSpPr>
+            <p:cNvPr id="34" name="TextBox 33"/>
+            <p:cNvSpPr txBox="1"/>
+            <p:nvPr/>
+          </p:nvSpPr>
+          <p:spPr>
+            <a:xfrm>
+              <a:off x="7306372" y="436879"/>
+              <a:ext cx="1209774" cy="923330"/>
+            </a:xfrm>
+            <a:prstGeom prst="rect">
+              <a:avLst/>
+            </a:prstGeom>
+            <a:ln>
+              <a:noFill/>
+            </a:ln>
+          </p:spPr>
+          <p:style>
+            <a:lnRef idx="2">
+              <a:schemeClr val="dk1"/>
+            </a:lnRef>
+            <a:fillRef idx="1">
+              <a:schemeClr val="lt1"/>
+            </a:fillRef>
+            <a:effectRef idx="0">
+              <a:schemeClr val="dk1"/>
+            </a:effectRef>
+            <a:fontRef idx="minor">
+              <a:schemeClr val="dk1"/>
+            </a:fontRef>
+          </p:style>
+          <p:txBody>
+            <a:bodyPr wrap="none" rtlCol="0">
+              <a:spAutoFit/>
+            </a:bodyPr>
+            <a:lstStyle/>
+            <a:p>
+              <a:pPr algn="ctr"/>
+              <a:r>
+                <a:rPr lang="de-DE" dirty="0" smtClean="0"/>
+                <a:t>conll:AM-TMP</a:t>
+              </a:r>
+            </a:p>
+          </p:txBody>
+        </p:sp>
+        <p:sp>
+          <p:nvSpPr>
+            <p:cNvPr id="35" name="Rounded Rectangle 34"/>
+            <p:cNvSpPr/>
+            <p:nvPr/>
+          </p:nvSpPr>
+          <p:spPr>
+            <a:xfrm>
+              <a:off x="7391400" y="441957"/>
+              <a:ext cx="1033441" cy="918252"/>
+            </a:xfrm>
+            <a:prstGeom prst="roundRect">
+              <a:avLst/>
+            </a:prstGeom>
+            <a:noFill/>
+          </p:spPr>
+          <p:style>
+            <a:lnRef idx="2">
+              <a:schemeClr val="dk1"/>
+            </a:lnRef>
+            <a:fillRef idx="1">
+              <a:schemeClr val="lt1"/>
+            </a:fillRef>
+            <a:effectRef idx="0">
+              <a:schemeClr val="dk1"/>
+            </a:effectRef>
+            <a:fontRef idx="minor">
+              <a:schemeClr val="dk1"/>
+            </a:fontRef>
+          </p:style>
+          <p:txBody>
+            <a:bodyPr rtlCol="0" anchor="ctr"/>
+            <a:lstStyle/>
+            <a:p>
+              <a:pPr algn="ctr"/>
+              <a:endParaRPr lang="de-DE"/>
+            </a:p>
+          </p:txBody>
+        </p:sp>
+      </p:grpSp>
+      <p:sp>
+        <p:nvSpPr>
+          <p:cNvPr id="36" name="TextBox 35"/>
+          <p:cNvSpPr txBox="1"/>
+          <p:nvPr/>
+        </p:nvSpPr>
+        <p:spPr>
+          <a:xfrm>
+            <a:off x="7086600" y="5835134"/>
+            <a:ext cx="1999265" cy="646331"/>
+          </a:xfrm>
+          <a:prstGeom prst="rect">
+            <a:avLst/>
+          </a:prstGeom>
+          <a:noFill/>
+        </p:spPr>
+        <p:txBody>
+          <a:bodyPr wrap="none" rtlCol="0">
+            <a:spAutoFit/>
+          </a:bodyPr>
+          <a:lstStyle/>
+          <a:p>
+            <a:pPr algn="ctr"/>
+            <a:r>
+              <a:rPr lang="de-DE" i="1" dirty="0" smtClean="0"/>
+              <a:t>(31 other PropBank</a:t>
+            </a:r>
+          </a:p>
+          <a:p>
+            <a:pPr algn="ctr"/>
+            <a:r>
+              <a:rPr lang="de-DE" i="1" dirty="0" smtClean="0"/>
+              <a:t>argument roles)</a:t>
+            </a:r>
+            <a:endParaRPr lang="de-DE" i="1" dirty="0"/>
+          </a:p>
+        </p:txBody>
+      </p:sp>
+      <p:sp>
+        <p:nvSpPr>
+          <p:cNvPr id="37" name="Isosceles Triangle 36"/>
+          <p:cNvSpPr/>
+          <p:nvPr/>
+        </p:nvSpPr>
+        <p:spPr>
+          <a:xfrm>
+            <a:off x="8411295" y="3729335"/>
+            <a:ext cx="199305" cy="235803"/>
+          </a:xfrm>
+          <a:prstGeom prst="triangle">
+            <a:avLst/>
+          </a:prstGeom>
+        </p:spPr>
+        <p:style>
+          <a:lnRef idx="2">
+            <a:schemeClr val="dk1"/>
+          </a:lnRef>
+          <a:fillRef idx="1">
+            <a:schemeClr val="lt1"/>
+          </a:fillRef>
+          <a:effectRef idx="0">
+            <a:schemeClr val="dk1"/>
+          </a:effectRef>
+          <a:fontRef idx="minor">
+            <a:schemeClr val="dk1"/>
+          </a:fontRef>
+        </p:style>
+        <p:txBody>
+          <a:bodyPr rtlCol="0" anchor="ctr"/>
+          <a:lstStyle/>
+          <a:p>
+            <a:pPr algn="ctr"/>
+            <a:endParaRPr lang="de-DE"/>
+          </a:p>
+        </p:txBody>
+      </p:sp>
+      <p:cxnSp>
+        <p:nvCxnSpPr>
+          <p:cNvPr id="41" name="Elbow Connector 40"/>
+          <p:cNvCxnSpPr>
+            <a:stCxn id="29" idx="3"/>
+            <a:endCxn id="37" idx="3"/>
+          </p:cNvCxnSpPr>
+          <p:nvPr/>
+        </p:nvCxnSpPr>
+        <p:spPr>
+          <a:xfrm flipV="1">
+            <a:off x="8305800" y="3965138"/>
+            <a:ext cx="205148" cy="377519"/>
+          </a:xfrm>
+          <a:prstGeom prst="bentConnector2">
+            <a:avLst/>
+          </a:prstGeom>
+          <a:ln>
+            <a:headEnd type="none" w="med" len="med"/>
+            <a:tailEnd type="none" w="med" len="med"/>
+          </a:ln>
+        </p:spPr>
+        <p:style>
+          <a:lnRef idx="2">
+            <a:schemeClr val="dk1"/>
+          </a:lnRef>
+          <a:fillRef idx="0">
+            <a:schemeClr val="dk1"/>
+          </a:fillRef>
+          <a:effectRef idx="1">
+            <a:schemeClr val="dk1"/>
+          </a:effectRef>
+          <a:fontRef idx="minor">
+            <a:schemeClr val="tx1"/>
+          </a:fontRef>
+        </p:style>
+      </p:cxnSp>
+      <p:cxnSp>
+        <p:nvCxnSpPr>
+          <p:cNvPr id="42" name="Elbow Connector 41"/>
+          <p:cNvCxnSpPr>
+            <a:stCxn id="32" idx="3"/>
+            <a:endCxn id="37" idx="3"/>
+          </p:cNvCxnSpPr>
+          <p:nvPr/>
+        </p:nvCxnSpPr>
+        <p:spPr>
+          <a:xfrm flipV="1">
+            <a:off x="8305800" y="3965138"/>
+            <a:ext cx="205148" cy="909318"/>
+          </a:xfrm>
+          <a:prstGeom prst="bentConnector2">
+            <a:avLst/>
+          </a:prstGeom>
+          <a:ln>
+            <a:headEnd type="none" w="med" len="med"/>
+            <a:tailEnd type="none" w="med" len="med"/>
+          </a:ln>
+        </p:spPr>
+        <p:style>
+          <a:lnRef idx="2">
+            <a:schemeClr val="dk1"/>
+          </a:lnRef>
+          <a:fillRef idx="0">
+            <a:schemeClr val="dk1"/>
+          </a:fillRef>
+          <a:effectRef idx="1">
+            <a:schemeClr val="dk1"/>
+          </a:effectRef>
+          <a:fontRef idx="minor">
+            <a:schemeClr val="tx1"/>
+          </a:fontRef>
+        </p:style>
+      </p:cxnSp>
+      <p:cxnSp>
+        <p:nvCxnSpPr>
+          <p:cNvPr id="46" name="Elbow Connector 45"/>
+          <p:cNvCxnSpPr>
+            <a:stCxn id="35" idx="3"/>
+            <a:endCxn id="37" idx="3"/>
+          </p:cNvCxnSpPr>
+          <p:nvPr/>
+        </p:nvCxnSpPr>
+        <p:spPr>
+          <a:xfrm flipV="1">
+            <a:off x="8316950" y="3965138"/>
+            <a:ext cx="193998" cy="1404882"/>
+          </a:xfrm>
+          <a:prstGeom prst="bentConnector2">
+            <a:avLst/>
+          </a:prstGeom>
+          <a:ln>
+            <a:headEnd type="none" w="med" len="med"/>
+            <a:tailEnd type="none" w="med" len="med"/>
+          </a:ln>
+        </p:spPr>
+        <p:style>
+          <a:lnRef idx="2">
+            <a:schemeClr val="dk1"/>
+          </a:lnRef>
+          <a:fillRef idx="0">
+            <a:schemeClr val="dk1"/>
+          </a:fillRef>
+          <a:effectRef idx="1">
+            <a:schemeClr val="dk1"/>
+          </a:effectRef>
+          <a:fontRef idx="minor">
+            <a:schemeClr val="tx1"/>
+          </a:fontRef>
+        </p:style>
+      </p:cxnSp>
+      <p:cxnSp>
+        <p:nvCxnSpPr>
+          <p:cNvPr id="48" name="Elbow Connector 47"/>
+          <p:cNvCxnSpPr>
+            <a:stCxn id="37" idx="3"/>
+            <a:endCxn id="79" idx="0"/>
+          </p:cNvCxnSpPr>
+          <p:nvPr/>
+        </p:nvCxnSpPr>
+        <p:spPr>
+          <a:xfrm rot="5400000">
+            <a:off x="7720995" y="4752049"/>
+            <a:ext cx="1576864" cy="3043"/>
+          </a:xfrm>
+          <a:prstGeom prst="bentConnector3">
+            <a:avLst/>
+          </a:prstGeom>
+          <a:ln>
+            <a:headEnd type="none" w="med" len="med"/>
+            <a:tailEnd type="none" w="med" len="med"/>
+          </a:ln>
+        </p:spPr>
+        <p:style>
+          <a:lnRef idx="2">
+            <a:schemeClr val="dk1"/>
+          </a:lnRef>
+          <a:fillRef idx="0">
+            <a:schemeClr val="dk1"/>
+          </a:fillRef>
+          <a:effectRef idx="1">
+            <a:schemeClr val="dk1"/>
+          </a:effectRef>
+          <a:fontRef idx="minor">
+            <a:schemeClr val="tx1"/>
+          </a:fontRef>
+        </p:style>
+      </p:cxnSp>
+      <p:sp>
+        <p:nvSpPr>
+          <p:cNvPr id="50" name="Isosceles Triangle 49"/>
+          <p:cNvSpPr/>
+          <p:nvPr/>
+        </p:nvSpPr>
+        <p:spPr>
+          <a:xfrm>
+            <a:off x="6897201" y="2274332"/>
+            <a:ext cx="199305" cy="235803"/>
+          </a:xfrm>
+          <a:prstGeom prst="triangle">
+            <a:avLst/>
+          </a:prstGeom>
+        </p:spPr>
+        <p:style>
+          <a:lnRef idx="2">
+            <a:schemeClr val="dk1"/>
+          </a:lnRef>
+          <a:fillRef idx="1">
+            <a:schemeClr val="lt1"/>
+          </a:fillRef>
+          <a:effectRef idx="0">
+            <a:schemeClr val="dk1"/>
+          </a:effectRef>
+          <a:fontRef idx="minor">
+            <a:schemeClr val="dk1"/>
+          </a:fontRef>
+        </p:style>
+        <p:txBody>
+          <a:bodyPr rtlCol="0" anchor="ctr"/>
+          <a:lstStyle/>
+          <a:p>
+            <a:pPr algn="ctr"/>
+            <a:endParaRPr lang="de-DE"/>
+          </a:p>
+        </p:txBody>
+      </p:sp>
+      <p:cxnSp>
+        <p:nvCxnSpPr>
+          <p:cNvPr id="52" name="Elbow Connector 51"/>
+          <p:cNvCxnSpPr>
+            <a:stCxn id="23" idx="3"/>
+            <a:endCxn id="50" idx="3"/>
+          </p:cNvCxnSpPr>
+          <p:nvPr/>
+        </p:nvCxnSpPr>
+        <p:spPr>
+          <a:xfrm flipV="1">
+            <a:off x="6348081" y="2510135"/>
+            <a:ext cx="648773" cy="254347"/>
+          </a:xfrm>
+          <a:prstGeom prst="bentConnector2">
+            <a:avLst/>
+          </a:prstGeom>
+          <a:ln>
+            <a:headEnd type="none" w="med" len="med"/>
+            <a:tailEnd type="none" w="med" len="med"/>
+          </a:ln>
+        </p:spPr>
+        <p:style>
+          <a:lnRef idx="2">
+            <a:schemeClr val="dk1"/>
+          </a:lnRef>
+          <a:fillRef idx="0">
+            <a:schemeClr val="dk1"/>
+          </a:fillRef>
+          <a:effectRef idx="1">
+            <a:schemeClr val="dk1"/>
+          </a:effectRef>
+          <a:fontRef idx="minor">
+            <a:schemeClr val="tx1"/>
+          </a:fontRef>
+        </p:style>
+      </p:cxnSp>
+      <p:cxnSp>
+        <p:nvCxnSpPr>
+          <p:cNvPr id="54" name="Elbow Connector 53"/>
+          <p:cNvCxnSpPr>
+            <a:stCxn id="50" idx="3"/>
+            <a:endCxn id="26" idx="1"/>
+          </p:cNvCxnSpPr>
+          <p:nvPr/>
+        </p:nvCxnSpPr>
+        <p:spPr>
+          <a:xfrm rot="16200000" flipH="1">
+            <a:off x="7228849" y="2278140"/>
+            <a:ext cx="253208" cy="717198"/>
+          </a:xfrm>
+          <a:prstGeom prst="bentConnector2">
+            <a:avLst/>
+          </a:prstGeom>
+          <a:ln>
+            <a:headEnd type="none" w="med" len="med"/>
+            <a:tailEnd type="none" w="med" len="med"/>
+          </a:ln>
+        </p:spPr>
+        <p:style>
+          <a:lnRef idx="2">
+            <a:schemeClr val="dk1"/>
+          </a:lnRef>
+          <a:fillRef idx="0">
+            <a:schemeClr val="dk1"/>
+          </a:fillRef>
+          <a:effectRef idx="1">
+            <a:schemeClr val="dk1"/>
+          </a:effectRef>
+          <a:fontRef idx="minor">
+            <a:schemeClr val="tx1"/>
+          </a:fontRef>
+        </p:style>
+      </p:cxnSp>
+      <p:sp>
+        <p:nvSpPr>
+          <p:cNvPr id="56" name="Isosceles Triangle 55"/>
+          <p:cNvSpPr/>
+          <p:nvPr/>
+        </p:nvSpPr>
+        <p:spPr>
+          <a:xfrm>
+            <a:off x="5731707" y="3122060"/>
+            <a:ext cx="199305" cy="235803"/>
+          </a:xfrm>
+          <a:prstGeom prst="triangle">
+            <a:avLst/>
+          </a:prstGeom>
+        </p:spPr>
+        <p:style>
+          <a:lnRef idx="2">
+            <a:schemeClr val="dk1"/>
+          </a:lnRef>
+          <a:fillRef idx="1">
+            <a:schemeClr val="lt1"/>
+          </a:fillRef>
+          <a:effectRef idx="0">
+            <a:schemeClr val="dk1"/>
+          </a:effectRef>
+          <a:fontRef idx="minor">
+            <a:schemeClr val="dk1"/>
+          </a:fontRef>
+        </p:style>
+        <p:txBody>
+          <a:bodyPr rtlCol="0" anchor="ctr"/>
+          <a:lstStyle/>
+          <a:p>
+            <a:pPr algn="ctr"/>
+            <a:endParaRPr lang="de-DE"/>
+          </a:p>
+        </p:txBody>
+      </p:sp>
+      <p:grpSp>
+        <p:nvGrpSpPr>
+          <p:cNvPr id="57" name="Group 56"/>
+          <p:cNvGrpSpPr/>
+          <p:nvPr/>
+        </p:nvGrpSpPr>
+        <p:grpSpPr>
+          <a:xfrm>
+            <a:off x="5181600" y="3662216"/>
+            <a:ext cx="1299517" cy="1055285"/>
+            <a:chOff x="7391400" y="436879"/>
+            <a:chExt cx="1033441" cy="1615828"/>
+          </a:xfrm>
+        </p:grpSpPr>
+        <p:sp>
+          <p:nvSpPr>
+            <p:cNvPr id="58" name="TextBox 57"/>
+            <p:cNvSpPr txBox="1"/>
+            <p:nvPr/>
+          </p:nvSpPr>
+          <p:spPr>
+            <a:xfrm>
+              <a:off x="7580679" y="436879"/>
+              <a:ext cx="661156" cy="1615828"/>
+            </a:xfrm>
+            <a:prstGeom prst="rect">
+              <a:avLst/>
+            </a:prstGeom>
+            <a:ln>
+              <a:noFill/>
+            </a:ln>
+          </p:spPr>
+          <p:style>
+            <a:lnRef idx="2">
+              <a:schemeClr val="dk1"/>
+            </a:lnRef>
+            <a:fillRef idx="1">
+              <a:schemeClr val="lt1"/>
+            </a:fillRef>
+            <a:effectRef idx="0">
+              <a:schemeClr val="dk1"/>
+            </a:effectRef>
+            <a:fontRef idx="minor">
+              <a:schemeClr val="dk1"/>
+            </a:fontRef>
+          </p:style>
+          <p:txBody>
+            <a:bodyPr wrap="none" rtlCol="0">
+              <a:spAutoFit/>
+            </a:bodyPr>
+            <a:lstStyle/>
+            <a:p>
+              <a:pPr algn="ctr"/>
+              <a:r>
+                <a:rPr lang="de-DE" dirty="0" smtClean="0"/>
+                <a:t>conll:</a:t>
+              </a:r>
+            </a:p>
+            <a:p>
+              <a:pPr algn="ctr"/>
+              <a:r>
+                <a:rPr lang="de-DE" dirty="0" smtClean="0"/>
+                <a:t>HEAD2</a:t>
+              </a:r>
+            </a:p>
+          </p:txBody>
+        </p:sp>
+        <p:sp>
+          <p:nvSpPr>
+            <p:cNvPr id="59" name="Rounded Rectangle 58"/>
+            <p:cNvSpPr/>
+            <p:nvPr/>
+          </p:nvSpPr>
+          <p:spPr>
+            <a:xfrm>
+              <a:off x="7391400" y="441957"/>
+              <a:ext cx="1033441" cy="918252"/>
+            </a:xfrm>
+            <a:prstGeom prst="roundRect">
+              <a:avLst/>
+            </a:prstGeom>
+            <a:noFill/>
+          </p:spPr>
+          <p:style>
+            <a:lnRef idx="2">
+              <a:schemeClr val="dk1"/>
+            </a:lnRef>
+            <a:fillRef idx="1">
+              <a:schemeClr val="lt1"/>
+            </a:fillRef>
+            <a:effectRef idx="0">
+              <a:schemeClr val="dk1"/>
+            </a:effectRef>
+            <a:fontRef idx="minor">
+              <a:schemeClr val="dk1"/>
+            </a:fontRef>
+          </p:style>
+          <p:txBody>
+            <a:bodyPr rtlCol="0" anchor="ctr"/>
+            <a:lstStyle/>
+            <a:p>
+              <a:pPr algn="ctr"/>
+              <a:endParaRPr lang="de-DE"/>
+            </a:p>
+          </p:txBody>
+        </p:sp>
+      </p:grpSp>
+      <p:cxnSp>
+        <p:nvCxnSpPr>
+          <p:cNvPr id="61" name="Elbow Connector 60"/>
+          <p:cNvCxnSpPr>
+            <a:stCxn id="56" idx="3"/>
+            <a:endCxn id="59" idx="0"/>
+          </p:cNvCxnSpPr>
+          <p:nvPr/>
+        </p:nvCxnSpPr>
+        <p:spPr>
+          <a:xfrm rot="5400000">
+            <a:off x="5677526" y="3511697"/>
+            <a:ext cx="307669" cy="1"/>
+          </a:xfrm>
+          <a:prstGeom prst="bentConnector3">
+            <a:avLst/>
+          </a:prstGeom>
+          <a:ln>
+            <a:headEnd type="none" w="med" len="med"/>
+            <a:tailEnd type="none" w="med" len="med"/>
+          </a:ln>
+        </p:spPr>
+        <p:style>
+          <a:lnRef idx="2">
+            <a:schemeClr val="dk1"/>
+          </a:lnRef>
+          <a:fillRef idx="0">
+            <a:schemeClr val="dk1"/>
+          </a:fillRef>
+          <a:effectRef idx="1">
+            <a:schemeClr val="dk1"/>
+          </a:effectRef>
+          <a:fontRef idx="minor">
+            <a:schemeClr val="tx1"/>
+          </a:fontRef>
+        </p:style>
+      </p:cxnSp>
+      <p:sp>
+        <p:nvSpPr>
+          <p:cNvPr id="62" name="TextBox 61"/>
+          <p:cNvSpPr txBox="1"/>
+          <p:nvPr/>
+        </p:nvSpPr>
+        <p:spPr>
+          <a:xfrm>
+            <a:off x="3581400" y="3253497"/>
+            <a:ext cx="1537280" cy="646331"/>
+          </a:xfrm>
+          <a:prstGeom prst="rect">
+            <a:avLst/>
+          </a:prstGeom>
+          <a:noFill/>
+        </p:spPr>
+        <p:txBody>
+          <a:bodyPr wrap="none" rtlCol="0">
+            <a:spAutoFit/>
+          </a:bodyPr>
+          <a:lstStyle/>
+          <a:p>
+            <a:pPr algn="ctr"/>
+            <a:r>
+              <a:rPr lang="de-DE" i="1" dirty="0" smtClean="0"/>
+              <a:t>(33 selected</a:t>
+            </a:r>
+          </a:p>
+          <a:p>
+            <a:pPr algn="ctr"/>
+            <a:r>
+              <a:rPr lang="de-DE" i="1" dirty="0" smtClean="0"/>
+              <a:t>column labels)</a:t>
+            </a:r>
+            <a:endParaRPr lang="de-DE" i="1" dirty="0"/>
+          </a:p>
+        </p:txBody>
+      </p:sp>
+      <p:sp>
+        <p:nvSpPr>
+          <p:cNvPr id="63" name="TextBox 62"/>
+          <p:cNvSpPr txBox="1"/>
+          <p:nvPr/>
+        </p:nvSpPr>
+        <p:spPr>
+          <a:xfrm>
+            <a:off x="7551446" y="3120367"/>
+            <a:ext cx="1575303" cy="646331"/>
+          </a:xfrm>
+          <a:prstGeom prst="rect">
+            <a:avLst/>
+          </a:prstGeom>
+          <a:noFill/>
+        </p:spPr>
+        <p:txBody>
+          <a:bodyPr wrap="none" rtlCol="0">
+            <a:spAutoFit/>
+          </a:bodyPr>
+          <a:lstStyle/>
+          <a:p>
+            <a:r>
+              <a:rPr lang="de-DE" i="1" dirty="0" smtClean="0"/>
+              <a:t>(values of SRL-</a:t>
+            </a:r>
+          </a:p>
+          <a:p>
+            <a:r>
+              <a:rPr lang="de-DE" i="1" dirty="0" smtClean="0"/>
+              <a:t>ARGs columns)</a:t>
+            </a:r>
+            <a:endParaRPr lang="de-DE" i="1" dirty="0"/>
+          </a:p>
+        </p:txBody>
+      </p:sp>
+      <p:sp>
+        <p:nvSpPr>
+          <p:cNvPr id="64" name="TextBox 63"/>
+          <p:cNvSpPr txBox="1"/>
+          <p:nvPr/>
+        </p:nvSpPr>
+        <p:spPr>
+          <a:xfrm>
+            <a:off x="5115122" y="4258270"/>
+            <a:ext cx="1454308" cy="923330"/>
+          </a:xfrm>
+          <a:prstGeom prst="rect">
+            <a:avLst/>
+          </a:prstGeom>
+          <a:noFill/>
+        </p:spPr>
+        <p:txBody>
+          <a:bodyPr wrap="none" rtlCol="0">
+            <a:spAutoFit/>
+          </a:bodyPr>
+          <a:lstStyle/>
+          <a:p>
+            <a:pPr algn="ctr"/>
+            <a:r>
+              <a:rPr lang="de-DE" i="1" dirty="0" smtClean="0"/>
+              <a:t>(columns  for </a:t>
+            </a:r>
+          </a:p>
+          <a:p>
+            <a:pPr algn="ctr"/>
+            <a:r>
+              <a:rPr lang="de-DE" i="1" dirty="0" smtClean="0"/>
+              <a:t>dependency</a:t>
+            </a:r>
+          </a:p>
+          <a:p>
+            <a:pPr algn="ctr"/>
+            <a:r>
+              <a:rPr lang="de-DE" i="1" dirty="0" smtClean="0"/>
+              <a:t>syntax)</a:t>
+            </a:r>
+            <a:endParaRPr lang="de-DE" i="1" dirty="0"/>
+          </a:p>
+        </p:txBody>
+      </p:sp>
+      <p:sp>
+        <p:nvSpPr>
+          <p:cNvPr id="70" name="TextBox 69"/>
+          <p:cNvSpPr txBox="1"/>
+          <p:nvPr/>
+        </p:nvSpPr>
+        <p:spPr>
+          <a:xfrm>
+            <a:off x="1492918" y="1409827"/>
+            <a:ext cx="1320874" cy="369332"/>
+          </a:xfrm>
+          <a:prstGeom prst="rect">
+            <a:avLst/>
+          </a:prstGeom>
+          <a:noFill/>
+        </p:spPr>
+        <p:txBody>
+          <a:bodyPr wrap="none" rtlCol="0">
+            <a:spAutoFit/>
+          </a:bodyPr>
+          <a:lstStyle/>
+          <a:p>
+            <a:r>
+              <a:rPr lang="de-DE" dirty="0" smtClean="0"/>
+              <a:t>conll:dialect</a:t>
+            </a:r>
+            <a:endParaRPr lang="de-DE" dirty="0"/>
+          </a:p>
+        </p:txBody>
+      </p:sp>
+      <p:cxnSp>
+        <p:nvCxnSpPr>
+          <p:cNvPr id="72" name="Straight Arrow Connector 71"/>
+          <p:cNvCxnSpPr>
+            <a:stCxn id="6" idx="2"/>
+            <a:endCxn id="7" idx="0"/>
+          </p:cNvCxnSpPr>
+          <p:nvPr/>
+        </p:nvCxnSpPr>
+        <p:spPr>
+          <a:xfrm flipH="1">
+            <a:off x="1341568" y="1298263"/>
+            <a:ext cx="13943" cy="770805"/>
+          </a:xfrm>
+          <a:prstGeom prst="straightConnector1">
+            <a:avLst/>
+          </a:prstGeom>
+          <a:ln>
+            <a:headEnd type="none" w="med" len="med"/>
+            <a:tailEnd type="arrow"/>
+          </a:ln>
+        </p:spPr>
+        <p:style>
+          <a:lnRef idx="2">
+            <a:schemeClr val="dk1"/>
+          </a:lnRef>
+          <a:fillRef idx="0">
+            <a:schemeClr val="dk1"/>
+          </a:fillRef>
+          <a:effectRef idx="1">
+            <a:schemeClr val="dk1"/>
+          </a:effectRef>
+          <a:fontRef idx="minor">
+            <a:schemeClr val="tx1"/>
+          </a:fontRef>
+        </p:style>
+      </p:cxnSp>
+      <p:sp>
+        <p:nvSpPr>
+          <p:cNvPr id="73" name="Isosceles Triangle 72"/>
+          <p:cNvSpPr/>
+          <p:nvPr/>
+        </p:nvSpPr>
+        <p:spPr>
+          <a:xfrm>
+            <a:off x="4425685" y="2311401"/>
+            <a:ext cx="199305" cy="235803"/>
+          </a:xfrm>
+          <a:prstGeom prst="triangle">
+            <a:avLst/>
+          </a:prstGeom>
+        </p:spPr>
+        <p:style>
+          <a:lnRef idx="2">
+            <a:schemeClr val="dk1"/>
+          </a:lnRef>
+          <a:fillRef idx="1">
+            <a:schemeClr val="lt1"/>
+          </a:fillRef>
+          <a:effectRef idx="0">
+            <a:schemeClr val="dk1"/>
+          </a:effectRef>
+          <a:fontRef idx="minor">
+            <a:schemeClr val="dk1"/>
+          </a:fontRef>
+        </p:style>
+        <p:txBody>
+          <a:bodyPr rtlCol="0" anchor="ctr"/>
+          <a:lstStyle/>
+          <a:p>
+            <a:pPr algn="ctr"/>
+            <a:endParaRPr lang="de-DE"/>
+          </a:p>
+        </p:txBody>
+      </p:sp>
+      <p:sp>
+        <p:nvSpPr>
+          <p:cNvPr id="74" name="TextBox 73"/>
+          <p:cNvSpPr txBox="1"/>
+          <p:nvPr/>
+        </p:nvSpPr>
+        <p:spPr>
+          <a:xfrm>
+            <a:off x="4343400" y="2957627"/>
+            <a:ext cx="357790" cy="369332"/>
+          </a:xfrm>
+          <a:prstGeom prst="rect">
+            <a:avLst/>
+          </a:prstGeom>
+          <a:noFill/>
+        </p:spPr>
+        <p:txBody>
+          <a:bodyPr wrap="none" rtlCol="0">
+            <a:spAutoFit/>
+          </a:bodyPr>
+          <a:lstStyle/>
+          <a:p>
+            <a:r>
+              <a:rPr lang="de-DE" dirty="0" smtClean="0"/>
+              <a:t>...</a:t>
+            </a:r>
+            <a:endParaRPr lang="de-DE" dirty="0"/>
+          </a:p>
+        </p:txBody>
+      </p:sp>
+      <p:cxnSp>
+        <p:nvCxnSpPr>
+          <p:cNvPr id="76" name="Elbow Connector 75"/>
+          <p:cNvCxnSpPr>
+            <a:stCxn id="74" idx="0"/>
+            <a:endCxn id="73" idx="3"/>
+          </p:cNvCxnSpPr>
+          <p:nvPr/>
+        </p:nvCxnSpPr>
+        <p:spPr>
+          <a:xfrm rot="5400000" flipH="1" flipV="1">
+            <a:off x="4318605" y="2750895"/>
+            <a:ext cx="410423" cy="3043"/>
+          </a:xfrm>
+          <a:prstGeom prst="bentConnector3">
+            <a:avLst/>
+          </a:prstGeom>
+          <a:ln>
+            <a:headEnd type="none" w="med" len="med"/>
+            <a:tailEnd type="none" w="med" len="med"/>
+          </a:ln>
+        </p:spPr>
+        <p:style>
+          <a:lnRef idx="2">
+            <a:schemeClr val="dk1"/>
+          </a:lnRef>
+          <a:fillRef idx="0">
+            <a:schemeClr val="dk1"/>
+          </a:fillRef>
+          <a:effectRef idx="1">
+            <a:schemeClr val="dk1"/>
+          </a:effectRef>
+          <a:fontRef idx="minor">
+            <a:schemeClr val="tx1"/>
+          </a:fontRef>
+        </p:style>
+      </p:cxnSp>
+      <p:sp>
+        <p:nvSpPr>
+          <p:cNvPr id="79" name="TextBox 78"/>
+          <p:cNvSpPr txBox="1"/>
+          <p:nvPr/>
+        </p:nvSpPr>
+        <p:spPr>
+          <a:xfrm>
+            <a:off x="8329010" y="5542002"/>
+            <a:ext cx="357790" cy="369332"/>
+          </a:xfrm>
+          <a:prstGeom prst="rect">
+            <a:avLst/>
+          </a:prstGeom>
+          <a:noFill/>
+        </p:spPr>
+        <p:txBody>
+          <a:bodyPr wrap="none" rtlCol="0">
+            <a:spAutoFit/>
+          </a:bodyPr>
+          <a:lstStyle/>
+          <a:p>
+            <a:r>
+              <a:rPr lang="de-DE" dirty="0" smtClean="0"/>
+              <a:t>...</a:t>
+            </a:r>
+            <a:endParaRPr lang="de-DE" dirty="0"/>
+          </a:p>
+        </p:txBody>
+      </p:sp>
+      <p:sp>
+        <p:nvSpPr>
+          <p:cNvPr id="88" name="TextBox 87"/>
+          <p:cNvSpPr txBox="1"/>
+          <p:nvPr/>
+        </p:nvSpPr>
+        <p:spPr>
+          <a:xfrm>
+            <a:off x="3200400" y="268069"/>
+            <a:ext cx="1537600" cy="646331"/>
+          </a:xfrm>
+          <a:prstGeom prst="rect">
+            <a:avLst/>
+          </a:prstGeom>
+          <a:noFill/>
+        </p:spPr>
+        <p:txBody>
+          <a:bodyPr wrap="none" rtlCol="0">
+            <a:spAutoFit/>
+          </a:bodyPr>
+          <a:lstStyle/>
+          <a:p>
+            <a:pPr algn="ctr"/>
+            <a:r>
+              <a:rPr lang="de-DE" dirty="0" smtClean="0"/>
+              <a:t>hasMapping / </a:t>
+            </a:r>
+          </a:p>
+          <a:p>
+            <a:pPr algn="ctr"/>
+            <a:r>
+              <a:rPr lang="de-DE" dirty="0" smtClean="0"/>
+              <a:t>^property</a:t>
+            </a:r>
+            <a:endParaRPr lang="de-DE" dirty="0"/>
+          </a:p>
+        </p:txBody>
+      </p:sp>
+      <p:grpSp>
+        <p:nvGrpSpPr>
+          <p:cNvPr id="91" name="Group 90"/>
+          <p:cNvGrpSpPr/>
+          <p:nvPr/>
+        </p:nvGrpSpPr>
+        <p:grpSpPr>
+          <a:xfrm>
+            <a:off x="5257800" y="649069"/>
+            <a:ext cx="1033441" cy="646331"/>
+            <a:chOff x="7391400" y="436879"/>
+            <a:chExt cx="1033441" cy="923330"/>
+          </a:xfrm>
+        </p:grpSpPr>
+        <p:sp>
+          <p:nvSpPr>
+            <p:cNvPr id="92" name="TextBox 91"/>
+            <p:cNvSpPr txBox="1"/>
+            <p:nvPr/>
+          </p:nvSpPr>
+          <p:spPr>
+            <a:xfrm>
+              <a:off x="7411215" y="436879"/>
+              <a:ext cx="1000082" cy="646331"/>
+            </a:xfrm>
+            <a:prstGeom prst="rect">
+              <a:avLst/>
+            </a:prstGeom>
+            <a:ln>
+              <a:noFill/>
+            </a:ln>
+          </p:spPr>
+          <p:style>
+            <a:lnRef idx="2">
+              <a:schemeClr val="dk1"/>
+            </a:lnRef>
+            <a:fillRef idx="1">
+              <a:schemeClr val="lt1"/>
+            </a:fillRef>
+            <a:effectRef idx="0">
+              <a:schemeClr val="dk1"/>
+            </a:effectRef>
+            <a:fontRef idx="minor">
+              <a:schemeClr val="dk1"/>
+            </a:fontRef>
+          </p:style>
+          <p:txBody>
+            <a:bodyPr wrap="none" rtlCol="0">
+              <a:spAutoFit/>
+            </a:bodyPr>
+            <a:lstStyle/>
+            <a:p>
+              <a:pPr algn="ctr"/>
+              <a:r>
+                <a:rPr lang="de-DE" dirty="0" smtClean="0"/>
+                <a:t>rdfs:</a:t>
+              </a:r>
+            </a:p>
+            <a:p>
+              <a:pPr algn="ctr"/>
+              <a:r>
+                <a:rPr lang="de-DE" dirty="0" smtClean="0"/>
+                <a:t>Property</a:t>
+              </a:r>
+            </a:p>
+          </p:txBody>
+        </p:sp>
+        <p:sp>
+          <p:nvSpPr>
+            <p:cNvPr id="93" name="Rounded Rectangle 92"/>
+            <p:cNvSpPr/>
+            <p:nvPr/>
+          </p:nvSpPr>
+          <p:spPr>
+            <a:xfrm>
+              <a:off x="7391400" y="441957"/>
+              <a:ext cx="1033441" cy="918252"/>
+            </a:xfrm>
+            <a:prstGeom prst="roundRect">
+              <a:avLst/>
+            </a:prstGeom>
+            <a:noFill/>
+          </p:spPr>
+          <p:style>
+            <a:lnRef idx="2">
+              <a:schemeClr val="dk1"/>
+            </a:lnRef>
+            <a:fillRef idx="1">
+              <a:schemeClr val="lt1"/>
+            </a:fillRef>
+            <a:effectRef idx="0">
+              <a:schemeClr val="dk1"/>
+            </a:effectRef>
+            <a:fontRef idx="minor">
+              <a:schemeClr val="dk1"/>
+            </a:fontRef>
+          </p:style>
+          <p:txBody>
+            <a:bodyPr rtlCol="0" anchor="ctr"/>
+            <a:lstStyle/>
+            <a:p>
+              <a:pPr algn="ctr"/>
+              <a:endParaRPr lang="de-DE"/>
+            </a:p>
+          </p:txBody>
+        </p:sp>
+      </p:grpSp>
+      <p:cxnSp>
+        <p:nvCxnSpPr>
+          <p:cNvPr id="95" name="Curved Connector 94"/>
+          <p:cNvCxnSpPr>
+            <a:stCxn id="93" idx="1"/>
+            <a:endCxn id="6" idx="3"/>
+          </p:cNvCxnSpPr>
+          <p:nvPr/>
+        </p:nvCxnSpPr>
+        <p:spPr>
+          <a:xfrm rot="10800000" flipV="1">
+            <a:off x="2482422" y="974012"/>
+            <a:ext cx="2775378" cy="1086"/>
+          </a:xfrm>
+          <a:prstGeom prst="curvedConnector3">
+            <a:avLst>
+              <a:gd name="adj1" fmla="val 50000"/>
+            </a:avLst>
+          </a:prstGeom>
+          <a:ln>
+            <a:headEnd type="none" w="med" len="med"/>
+            <a:tailEnd type="arrow"/>
+          </a:ln>
+        </p:spPr>
+        <p:style>
+          <a:lnRef idx="2">
+            <a:schemeClr val="dk1"/>
+          </a:lnRef>
+          <a:fillRef idx="0">
+            <a:schemeClr val="dk1"/>
+          </a:fillRef>
+          <a:effectRef idx="1">
+            <a:schemeClr val="dk1"/>
+          </a:effectRef>
+          <a:fontRef idx="minor">
+            <a:schemeClr val="tx1"/>
+          </a:fontRef>
+        </p:style>
+      </p:cxnSp>
+      <p:sp>
+        <p:nvSpPr>
+          <p:cNvPr id="106" name="Isosceles Triangle 105"/>
+          <p:cNvSpPr/>
+          <p:nvPr/>
+        </p:nvSpPr>
+        <p:spPr>
+          <a:xfrm>
+            <a:off x="5674867" y="1288197"/>
+            <a:ext cx="199305" cy="235803"/>
+          </a:xfrm>
+          <a:prstGeom prst="triangle">
+            <a:avLst/>
+          </a:prstGeom>
+        </p:spPr>
+        <p:style>
+          <a:lnRef idx="2">
+            <a:schemeClr val="dk1"/>
+          </a:lnRef>
+          <a:fillRef idx="1">
+            <a:schemeClr val="lt1"/>
+          </a:fillRef>
+          <a:effectRef idx="0">
+            <a:schemeClr val="dk1"/>
+          </a:effectRef>
+          <a:fontRef idx="minor">
+            <a:schemeClr val="dk1"/>
+          </a:fontRef>
+        </p:style>
+        <p:txBody>
+          <a:bodyPr rtlCol="0" anchor="ctr"/>
+          <a:lstStyle/>
+          <a:p>
+            <a:pPr algn="ctr"/>
+            <a:endParaRPr lang="de-DE"/>
+          </a:p>
+        </p:txBody>
+      </p:sp>
+      <p:cxnSp>
+        <p:nvCxnSpPr>
+          <p:cNvPr id="108" name="Elbow Connector 107"/>
+          <p:cNvCxnSpPr>
+            <a:stCxn id="14" idx="3"/>
+            <a:endCxn id="106" idx="3"/>
+          </p:cNvCxnSpPr>
+          <p:nvPr/>
+        </p:nvCxnSpPr>
+        <p:spPr>
+          <a:xfrm flipV="1">
+            <a:off x="5042480" y="1524000"/>
+            <a:ext cx="732040" cy="273709"/>
+          </a:xfrm>
+          <a:prstGeom prst="bentConnector2">
+            <a:avLst/>
+          </a:prstGeom>
+          <a:ln>
+            <a:headEnd type="none" w="med" len="med"/>
+            <a:tailEnd type="none" w="med" len="med"/>
+          </a:ln>
+        </p:spPr>
+        <p:style>
+          <a:lnRef idx="2">
+            <a:schemeClr val="dk1"/>
+          </a:lnRef>
+          <a:fillRef idx="0">
+            <a:schemeClr val="dk1"/>
+          </a:fillRef>
+          <a:effectRef idx="1">
+            <a:schemeClr val="dk1"/>
+          </a:effectRef>
+          <a:fontRef idx="minor">
+            <a:schemeClr val="tx1"/>
+          </a:fontRef>
+        </p:style>
+      </p:cxnSp>
+      <p:cxnSp>
+        <p:nvCxnSpPr>
+          <p:cNvPr id="110" name="Elbow Connector 109"/>
+          <p:cNvCxnSpPr>
+            <a:stCxn id="15" idx="1"/>
+            <a:endCxn id="106" idx="3"/>
+          </p:cNvCxnSpPr>
+          <p:nvPr/>
+        </p:nvCxnSpPr>
+        <p:spPr>
+          <a:xfrm rot="10800000">
+            <a:off x="5774520" y="1524000"/>
+            <a:ext cx="722294" cy="272534"/>
+          </a:xfrm>
+          <a:prstGeom prst="bentConnector2">
+            <a:avLst/>
+          </a:prstGeom>
+          <a:ln>
+            <a:headEnd type="none" w="med" len="med"/>
+            <a:tailEnd type="none" w="med" len="med"/>
+          </a:ln>
+        </p:spPr>
+        <p:style>
+          <a:lnRef idx="2">
+            <a:schemeClr val="dk1"/>
+          </a:lnRef>
+          <a:fillRef idx="0">
+            <a:schemeClr val="dk1"/>
+          </a:fillRef>
+          <a:effectRef idx="1">
+            <a:schemeClr val="dk1"/>
+          </a:effectRef>
+          <a:fontRef idx="minor">
+            <a:schemeClr val="tx1"/>
+          </a:fontRef>
+        </p:style>
+      </p:cxnSp>
+      <p:sp>
+        <p:nvSpPr>
+          <p:cNvPr id="116" name="TextBox 115"/>
+          <p:cNvSpPr txBox="1"/>
+          <p:nvPr/>
+        </p:nvSpPr>
+        <p:spPr>
+          <a:xfrm>
+            <a:off x="461219" y="2514600"/>
+            <a:ext cx="1672381" cy="646331"/>
+          </a:xfrm>
+          <a:prstGeom prst="rect">
+            <a:avLst/>
+          </a:prstGeom>
+          <a:noFill/>
+        </p:spPr>
+        <p:txBody>
+          <a:bodyPr wrap="none" rtlCol="0">
+            <a:spAutoFit/>
+          </a:bodyPr>
+          <a:lstStyle/>
+          <a:p>
+            <a:pPr algn="ctr"/>
+            <a:r>
+              <a:rPr lang="de-DE" i="1" dirty="0" smtClean="0"/>
+              <a:t>(instances: </a:t>
+            </a:r>
+          </a:p>
+          <a:p>
+            <a:pPr algn="ctr"/>
+            <a:r>
+              <a:rPr lang="de-DE" i="1" dirty="0" smtClean="0"/>
+              <a:t>20 TSV formats)</a:t>
+            </a:r>
+            <a:endParaRPr lang="de-DE" i="1" dirty="0"/>
+          </a:p>
+        </p:txBody>
+      </p:sp>
+      <p:sp>
+        <p:nvSpPr>
+          <p:cNvPr id="122" name="TextBox 121"/>
+          <p:cNvSpPr txBox="1"/>
+          <p:nvPr/>
+        </p:nvSpPr>
+        <p:spPr>
+          <a:xfrm>
+            <a:off x="193678" y="6183868"/>
+            <a:ext cx="1210588" cy="523220"/>
+          </a:xfrm>
+          <a:prstGeom prst="rect">
+            <a:avLst/>
+          </a:prstGeom>
+          <a:noFill/>
+        </p:spPr>
+        <p:txBody>
+          <a:bodyPr wrap="none" rtlCol="0">
+            <a:spAutoFit/>
+          </a:bodyPr>
+          <a:lstStyle/>
+          <a:p>
+            <a:r>
+              <a:rPr lang="de-DE" sz="2800" dirty="0" smtClean="0"/>
+              <a:t>NIF 2.0</a:t>
+            </a:r>
+            <a:endParaRPr lang="de-DE" sz="2800" dirty="0"/>
+          </a:p>
+        </p:txBody>
+      </p:sp>
+      <p:sp>
+        <p:nvSpPr>
+          <p:cNvPr id="131" name="TextBox 130"/>
+          <p:cNvSpPr txBox="1"/>
+          <p:nvPr/>
+        </p:nvSpPr>
+        <p:spPr>
+          <a:xfrm>
+            <a:off x="1828800" y="3745468"/>
+            <a:ext cx="1316642" cy="369332"/>
+          </a:xfrm>
+          <a:prstGeom prst="rect">
+            <a:avLst/>
+          </a:prstGeom>
+          <a:solidFill>
+            <a:schemeClr val="bg1"/>
+          </a:solidFill>
+        </p:spPr>
+        <p:txBody>
+          <a:bodyPr wrap="none" rtlCol="0">
+            <a:spAutoFit/>
+          </a:bodyPr>
+          <a:lstStyle/>
+          <a:p>
+            <a:r>
+              <a:rPr lang="de-DE" i="1" dirty="0" smtClean="0"/>
+              <a:t>rdfs:domain</a:t>
+            </a:r>
+            <a:endParaRPr lang="de-DE" i="1" dirty="0"/>
+          </a:p>
+        </p:txBody>
+      </p:sp>
+      <p:grpSp>
+        <p:nvGrpSpPr>
+          <p:cNvPr id="55" name="Group 54"/>
+          <p:cNvGrpSpPr/>
+          <p:nvPr/>
+        </p:nvGrpSpPr>
+        <p:grpSpPr>
+          <a:xfrm>
+            <a:off x="3975680" y="1320801"/>
+            <a:ext cx="1066800" cy="989001"/>
+            <a:chOff x="5715000" y="441957"/>
+            <a:chExt cx="1066800" cy="989001"/>
+          </a:xfrm>
+        </p:grpSpPr>
+        <p:sp>
+          <p:nvSpPr>
+            <p:cNvPr id="18" name="Rounded Rectangle 17"/>
+            <p:cNvSpPr/>
+            <p:nvPr/>
+          </p:nvSpPr>
+          <p:spPr>
+            <a:xfrm>
+              <a:off x="5715000" y="441957"/>
+              <a:ext cx="1066800" cy="989001"/>
+            </a:xfrm>
+            <a:prstGeom prst="roundRect">
+              <a:avLst/>
+            </a:prstGeom>
+            <a:noFill/>
+          </p:spPr>
+          <p:style>
+            <a:lnRef idx="2">
+              <a:schemeClr val="dk1"/>
+            </a:lnRef>
+            <a:fillRef idx="1">
+              <a:schemeClr val="lt1"/>
+            </a:fillRef>
+            <a:effectRef idx="0">
+              <a:schemeClr val="dk1"/>
+            </a:effectRef>
+            <a:fontRef idx="minor">
+              <a:schemeClr val="dk1"/>
+            </a:fontRef>
+          </p:style>
+          <p:txBody>
+            <a:bodyPr rtlCol="0" anchor="ctr"/>
+            <a:lstStyle/>
+            <a:p>
+              <a:pPr algn="ctr"/>
+              <a:endParaRPr lang="de-DE"/>
+            </a:p>
+          </p:txBody>
+        </p:sp>
+        <p:sp>
+          <p:nvSpPr>
+            <p:cNvPr id="14" name="TextBox 13"/>
+            <p:cNvSpPr txBox="1"/>
+            <p:nvPr/>
+          </p:nvSpPr>
+          <p:spPr>
+            <a:xfrm>
+              <a:off x="5744978" y="457200"/>
+              <a:ext cx="1036822" cy="923330"/>
+            </a:xfrm>
+            <a:prstGeom prst="rect">
+              <a:avLst/>
+            </a:prstGeom>
+            <a:noFill/>
+            <a:ln>
+              <a:noFill/>
+            </a:ln>
+          </p:spPr>
+          <p:style>
+            <a:lnRef idx="2">
+              <a:schemeClr val="dk1"/>
+            </a:lnRef>
+            <a:fillRef idx="1">
+              <a:schemeClr val="lt1"/>
+            </a:fillRef>
+            <a:effectRef idx="0">
+              <a:schemeClr val="dk1"/>
+            </a:effectRef>
+            <a:fontRef idx="minor">
+              <a:schemeClr val="dk1"/>
+            </a:fontRef>
+          </p:style>
+          <p:txBody>
+            <a:bodyPr wrap="none" rtlCol="0">
+              <a:spAutoFit/>
+            </a:bodyPr>
+            <a:lstStyle/>
+            <a:p>
+              <a:pPr algn="ctr"/>
+              <a:r>
+                <a:rPr lang="de-DE" dirty="0" smtClean="0"/>
+                <a:t>conll:</a:t>
+              </a:r>
+            </a:p>
+            <a:p>
+              <a:pPr algn="ctr"/>
+              <a:r>
+                <a:rPr lang="de-DE" dirty="0" smtClean="0"/>
+                <a:t>Datatype</a:t>
+              </a:r>
+            </a:p>
+            <a:p>
+              <a:pPr algn="ctr"/>
+              <a:r>
+                <a:rPr lang="de-DE" dirty="0" smtClean="0"/>
+                <a:t>Property</a:t>
+              </a:r>
+            </a:p>
+          </p:txBody>
+        </p:sp>
+      </p:grpSp>
+      <p:sp>
+        <p:nvSpPr>
+          <p:cNvPr id="142" name="TextBox 141"/>
+          <p:cNvSpPr txBox="1"/>
+          <p:nvPr/>
+        </p:nvSpPr>
+        <p:spPr>
+          <a:xfrm>
+            <a:off x="7596128" y="304800"/>
+            <a:ext cx="1481368" cy="830997"/>
+          </a:xfrm>
+          <a:prstGeom prst="rect">
+            <a:avLst/>
+          </a:prstGeom>
+          <a:noFill/>
+        </p:spPr>
+        <p:txBody>
+          <a:bodyPr wrap="none" rtlCol="0">
+            <a:spAutoFit/>
+          </a:bodyPr>
+          <a:lstStyle/>
+          <a:p>
+            <a:pPr algn="ctr"/>
+            <a:r>
+              <a:rPr lang="de-DE" sz="2400" dirty="0" smtClean="0"/>
+              <a:t>CoNLL </a:t>
+            </a:r>
+          </a:p>
+          <a:p>
+            <a:pPr algn="ctr"/>
+            <a:r>
+              <a:rPr lang="de-DE" sz="2400" dirty="0" smtClean="0"/>
+              <a:t>properties</a:t>
+            </a:r>
+            <a:endParaRPr lang="de-DE" sz="2400" dirty="0"/>
+          </a:p>
+        </p:txBody>
+      </p:sp>
+      <p:sp>
+        <p:nvSpPr>
+          <p:cNvPr id="143" name="TextBox 142"/>
+          <p:cNvSpPr txBox="1"/>
+          <p:nvPr/>
+        </p:nvSpPr>
+        <p:spPr>
+          <a:xfrm>
+            <a:off x="228600" y="71735"/>
+            <a:ext cx="2307592" cy="461665"/>
+          </a:xfrm>
+          <a:prstGeom prst="rect">
+            <a:avLst/>
+          </a:prstGeom>
+          <a:noFill/>
+        </p:spPr>
+        <p:txBody>
+          <a:bodyPr wrap="square" rtlCol="0">
+            <a:spAutoFit/>
+          </a:bodyPr>
+          <a:lstStyle/>
+          <a:p>
+            <a:pPr algn="ctr"/>
+            <a:r>
+              <a:rPr lang="de-DE" sz="2400" dirty="0" smtClean="0"/>
+              <a:t>CoNLL concepts</a:t>
+            </a:r>
+            <a:endParaRPr lang="de-DE" sz="2400" dirty="0"/>
+          </a:p>
+        </p:txBody>
+      </p:sp>
+      <p:sp>
+        <p:nvSpPr>
+          <p:cNvPr id="149" name="TextBox 148"/>
+          <p:cNvSpPr txBox="1"/>
+          <p:nvPr/>
+        </p:nvSpPr>
+        <p:spPr>
+          <a:xfrm>
+            <a:off x="2514600" y="5105400"/>
+            <a:ext cx="2477153" cy="923330"/>
+          </a:xfrm>
+          <a:prstGeom prst="rect">
+            <a:avLst/>
+          </a:prstGeom>
+          <a:noFill/>
+        </p:spPr>
+        <p:txBody>
+          <a:bodyPr wrap="none" rtlCol="0">
+            <a:spAutoFit/>
+          </a:bodyPr>
+          <a:lstStyle/>
+          <a:p>
+            <a:r>
+              <a:rPr lang="de-DE" dirty="0" smtClean="0"/>
+              <a:t>	   </a:t>
+            </a:r>
+            <a:r>
+              <a:rPr lang="de-DE" strike="sngStrike" dirty="0" smtClean="0"/>
+              <a:t>nif:sentence</a:t>
+            </a:r>
+          </a:p>
+          <a:p>
+            <a:r>
+              <a:rPr lang="de-DE" i="1" dirty="0" smtClean="0"/>
+              <a:t>(superseded  	</a:t>
+            </a:r>
+          </a:p>
+          <a:p>
+            <a:r>
+              <a:rPr lang="de-DE" i="1" dirty="0" smtClean="0"/>
+              <a:t>by conll:HEAD)    </a:t>
+            </a:r>
+            <a:endParaRPr lang="de-DE" i="1" dirty="0"/>
+          </a:p>
+        </p:txBody>
+      </p:sp>
+      <p:cxnSp>
+        <p:nvCxnSpPr>
+          <p:cNvPr id="151" name="Curved Connector 150"/>
+          <p:cNvCxnSpPr>
+            <a:stCxn id="4" idx="3"/>
+            <a:endCxn id="5" idx="0"/>
+          </p:cNvCxnSpPr>
+          <p:nvPr/>
+        </p:nvCxnSpPr>
+        <p:spPr>
+          <a:xfrm>
+            <a:off x="2473642" y="5225534"/>
+            <a:ext cx="2028830" cy="882133"/>
+          </a:xfrm>
+          <a:prstGeom prst="curvedConnector2">
+            <a:avLst/>
+          </a:prstGeom>
+          <a:ln>
+            <a:prstDash val="sysDot"/>
+            <a:headEnd type="none" w="med" len="med"/>
+            <a:tailEnd type="arrow"/>
+          </a:ln>
+        </p:spPr>
+        <p:style>
+          <a:lnRef idx="2">
+            <a:schemeClr val="dk1"/>
+          </a:lnRef>
+          <a:fillRef idx="0">
+            <a:schemeClr val="dk1"/>
+          </a:fillRef>
+          <a:effectRef idx="1">
+            <a:schemeClr val="dk1"/>
+          </a:effectRef>
+          <a:fontRef idx="minor">
+            <a:schemeClr val="tx1"/>
+          </a:fontRef>
+        </p:style>
+      </p:cxnSp>
+    </p:spTree>
+    <p:extLst>
+      <p:ext uri="{BB962C8B-B14F-4D97-AF65-F5344CB8AC3E}">
+        <p14:creationId xmlns:p14="http://schemas.microsoft.com/office/powerpoint/2010/main" val="3542209201"/>
       </p:ext>
     </p:extLst>
   </p:cSld>

</xml_diff>